<commit_message>
agrego version revealjs de la presentación. estilos de imagenes y mas previexs.
</commit_message>
<xml_diff>
--- a/IDERA/idera-styles.pptx
+++ b/IDERA/idera-styles.pptx
@@ -62,7 +62,7 @@
       </p:grpSpPr>
       <p:sp>
         <p:nvSpPr>
-          <p:cNvPr id="29" name="PlaceHolder 1"/>
+          <p:cNvPr id="30" name="PlaceHolder 1"/>
           <p:cNvSpPr>
             <a:spLocks noGrp="1"/>
           </p:cNvSpPr>
@@ -99,7 +99,7 @@
       </p:sp>
       <p:sp>
         <p:nvSpPr>
-          <p:cNvPr id="30" name="PlaceHolder 2"/>
+          <p:cNvPr id="31" name="PlaceHolder 2"/>
           <p:cNvSpPr>
             <a:spLocks noGrp="1"/>
           </p:cNvSpPr>
@@ -133,7 +133,7 @@
       </p:sp>
       <p:sp>
         <p:nvSpPr>
-          <p:cNvPr id="31" name="PlaceHolder 3"/>
+          <p:cNvPr id="32" name="PlaceHolder 3"/>
           <p:cNvSpPr>
             <a:spLocks noGrp="1"/>
           </p:cNvSpPr>
@@ -189,7 +189,7 @@
       </p:grpSpPr>
       <p:sp>
         <p:nvSpPr>
-          <p:cNvPr id="32" name="PlaceHolder 1"/>
+          <p:cNvPr id="33" name="PlaceHolder 1"/>
           <p:cNvSpPr>
             <a:spLocks noGrp="1"/>
           </p:cNvSpPr>
@@ -226,7 +226,7 @@
       </p:sp>
       <p:sp>
         <p:nvSpPr>
-          <p:cNvPr id="33" name="PlaceHolder 2"/>
+          <p:cNvPr id="34" name="PlaceHolder 2"/>
           <p:cNvSpPr>
             <a:spLocks noGrp="1"/>
           </p:cNvSpPr>
@@ -260,7 +260,7 @@
       </p:sp>
       <p:sp>
         <p:nvSpPr>
-          <p:cNvPr id="34" name="PlaceHolder 3"/>
+          <p:cNvPr id="35" name="PlaceHolder 3"/>
           <p:cNvSpPr>
             <a:spLocks noGrp="1"/>
           </p:cNvSpPr>
@@ -294,7 +294,7 @@
       </p:sp>
       <p:sp>
         <p:nvSpPr>
-          <p:cNvPr id="35" name="PlaceHolder 4"/>
+          <p:cNvPr id="36" name="PlaceHolder 4"/>
           <p:cNvSpPr>
             <a:spLocks noGrp="1"/>
           </p:cNvSpPr>
@@ -328,7 +328,7 @@
       </p:sp>
       <p:sp>
         <p:nvSpPr>
-          <p:cNvPr id="36" name="PlaceHolder 5"/>
+          <p:cNvPr id="37" name="PlaceHolder 5"/>
           <p:cNvSpPr>
             <a:spLocks noGrp="1"/>
           </p:cNvSpPr>
@@ -384,7 +384,7 @@
       </p:grpSpPr>
       <p:sp>
         <p:nvSpPr>
-          <p:cNvPr id="37" name="PlaceHolder 1"/>
+          <p:cNvPr id="38" name="PlaceHolder 1"/>
           <p:cNvSpPr>
             <a:spLocks noGrp="1"/>
           </p:cNvSpPr>
@@ -421,7 +421,7 @@
       </p:sp>
       <p:sp>
         <p:nvSpPr>
-          <p:cNvPr id="38" name="PlaceHolder 2"/>
+          <p:cNvPr id="39" name="PlaceHolder 2"/>
           <p:cNvSpPr>
             <a:spLocks noGrp="1"/>
           </p:cNvSpPr>
@@ -455,7 +455,7 @@
       </p:sp>
       <p:sp>
         <p:nvSpPr>
-          <p:cNvPr id="39" name="PlaceHolder 3"/>
+          <p:cNvPr id="40" name="PlaceHolder 3"/>
           <p:cNvSpPr>
             <a:spLocks noGrp="1"/>
           </p:cNvSpPr>
@@ -489,7 +489,7 @@
       </p:sp>
       <p:sp>
         <p:nvSpPr>
-          <p:cNvPr id="40" name="PlaceHolder 4"/>
+          <p:cNvPr id="41" name="PlaceHolder 4"/>
           <p:cNvSpPr>
             <a:spLocks noGrp="1"/>
           </p:cNvSpPr>
@@ -523,7 +523,7 @@
       </p:sp>
       <p:sp>
         <p:nvSpPr>
-          <p:cNvPr id="41" name="PlaceHolder 5"/>
+          <p:cNvPr id="42" name="PlaceHolder 5"/>
           <p:cNvSpPr>
             <a:spLocks noGrp="1"/>
           </p:cNvSpPr>
@@ -557,7 +557,7 @@
       </p:sp>
       <p:sp>
         <p:nvSpPr>
-          <p:cNvPr id="42" name="PlaceHolder 6"/>
+          <p:cNvPr id="43" name="PlaceHolder 6"/>
           <p:cNvSpPr>
             <a:spLocks noGrp="1"/>
           </p:cNvSpPr>
@@ -591,7 +591,7 @@
       </p:sp>
       <p:sp>
         <p:nvSpPr>
-          <p:cNvPr id="43" name="PlaceHolder 7"/>
+          <p:cNvPr id="44" name="PlaceHolder 7"/>
           <p:cNvSpPr>
             <a:spLocks noGrp="1"/>
           </p:cNvSpPr>
@@ -669,7 +669,7 @@
       </p:grpSpPr>
       <p:sp>
         <p:nvSpPr>
-          <p:cNvPr id="53" name="PlaceHolder 1"/>
+          <p:cNvPr id="54" name="PlaceHolder 1"/>
           <p:cNvSpPr>
             <a:spLocks noGrp="1"/>
           </p:cNvSpPr>
@@ -706,7 +706,7 @@
       </p:sp>
       <p:sp>
         <p:nvSpPr>
-          <p:cNvPr id="54" name="PlaceHolder 2"/>
+          <p:cNvPr id="55" name="PlaceHolder 2"/>
           <p:cNvSpPr>
             <a:spLocks noGrp="1"/>
           </p:cNvSpPr>
@@ -765,7 +765,7 @@
       </p:grpSpPr>
       <p:sp>
         <p:nvSpPr>
-          <p:cNvPr id="55" name="PlaceHolder 1"/>
+          <p:cNvPr id="56" name="PlaceHolder 1"/>
           <p:cNvSpPr>
             <a:spLocks noGrp="1"/>
           </p:cNvSpPr>
@@ -802,7 +802,7 @@
       </p:sp>
       <p:sp>
         <p:nvSpPr>
-          <p:cNvPr id="56" name="PlaceHolder 2"/>
+          <p:cNvPr id="57" name="PlaceHolder 2"/>
           <p:cNvSpPr>
             <a:spLocks noGrp="1"/>
           </p:cNvSpPr>
@@ -858,7 +858,7 @@
       </p:grpSpPr>
       <p:sp>
         <p:nvSpPr>
-          <p:cNvPr id="57" name="PlaceHolder 1"/>
+          <p:cNvPr id="58" name="PlaceHolder 1"/>
           <p:cNvSpPr>
             <a:spLocks noGrp="1"/>
           </p:cNvSpPr>
@@ -895,7 +895,7 @@
       </p:sp>
       <p:sp>
         <p:nvSpPr>
-          <p:cNvPr id="58" name="PlaceHolder 2"/>
+          <p:cNvPr id="59" name="PlaceHolder 2"/>
           <p:cNvSpPr>
             <a:spLocks noGrp="1"/>
           </p:cNvSpPr>
@@ -929,7 +929,7 @@
       </p:sp>
       <p:sp>
         <p:nvSpPr>
-          <p:cNvPr id="59" name="PlaceHolder 3"/>
+          <p:cNvPr id="60" name="PlaceHolder 3"/>
           <p:cNvSpPr>
             <a:spLocks noGrp="1"/>
           </p:cNvSpPr>
@@ -985,7 +985,7 @@
       </p:grpSpPr>
       <p:sp>
         <p:nvSpPr>
-          <p:cNvPr id="60" name="PlaceHolder 1"/>
+          <p:cNvPr id="61" name="PlaceHolder 1"/>
           <p:cNvSpPr>
             <a:spLocks noGrp="1"/>
           </p:cNvSpPr>
@@ -1044,7 +1044,7 @@
       </p:grpSpPr>
       <p:sp>
         <p:nvSpPr>
-          <p:cNvPr id="61" name="PlaceHolder 1"/>
+          <p:cNvPr id="62" name="PlaceHolder 1"/>
           <p:cNvSpPr>
             <a:spLocks noGrp="1"/>
           </p:cNvSpPr>
@@ -1103,7 +1103,7 @@
       </p:grpSpPr>
       <p:sp>
         <p:nvSpPr>
-          <p:cNvPr id="62" name="PlaceHolder 1"/>
+          <p:cNvPr id="63" name="PlaceHolder 1"/>
           <p:cNvSpPr>
             <a:spLocks noGrp="1"/>
           </p:cNvSpPr>
@@ -1140,7 +1140,7 @@
       </p:sp>
       <p:sp>
         <p:nvSpPr>
-          <p:cNvPr id="63" name="PlaceHolder 2"/>
+          <p:cNvPr id="64" name="PlaceHolder 2"/>
           <p:cNvSpPr>
             <a:spLocks noGrp="1"/>
           </p:cNvSpPr>
@@ -1174,7 +1174,7 @@
       </p:sp>
       <p:sp>
         <p:nvSpPr>
-          <p:cNvPr id="64" name="PlaceHolder 3"/>
+          <p:cNvPr id="65" name="PlaceHolder 3"/>
           <p:cNvSpPr>
             <a:spLocks noGrp="1"/>
           </p:cNvSpPr>
@@ -1208,7 +1208,7 @@
       </p:sp>
       <p:sp>
         <p:nvSpPr>
-          <p:cNvPr id="65" name="PlaceHolder 4"/>
+          <p:cNvPr id="66" name="PlaceHolder 4"/>
           <p:cNvSpPr>
             <a:spLocks noGrp="1"/>
           </p:cNvSpPr>
@@ -1264,7 +1264,7 @@
       </p:grpSpPr>
       <p:sp>
         <p:nvSpPr>
-          <p:cNvPr id="8" name="PlaceHolder 1"/>
+          <p:cNvPr id="9" name="PlaceHolder 1"/>
           <p:cNvSpPr>
             <a:spLocks noGrp="1"/>
           </p:cNvSpPr>
@@ -1301,7 +1301,7 @@
       </p:sp>
       <p:sp>
         <p:nvSpPr>
-          <p:cNvPr id="9" name="PlaceHolder 2"/>
+          <p:cNvPr id="10" name="PlaceHolder 2"/>
           <p:cNvSpPr>
             <a:spLocks noGrp="1"/>
           </p:cNvSpPr>
@@ -1360,7 +1360,7 @@
       </p:grpSpPr>
       <p:sp>
         <p:nvSpPr>
-          <p:cNvPr id="66" name="PlaceHolder 1"/>
+          <p:cNvPr id="67" name="PlaceHolder 1"/>
           <p:cNvSpPr>
             <a:spLocks noGrp="1"/>
           </p:cNvSpPr>
@@ -1397,7 +1397,7 @@
       </p:sp>
       <p:sp>
         <p:nvSpPr>
-          <p:cNvPr id="67" name="PlaceHolder 2"/>
+          <p:cNvPr id="68" name="PlaceHolder 2"/>
           <p:cNvSpPr>
             <a:spLocks noGrp="1"/>
           </p:cNvSpPr>
@@ -1431,7 +1431,7 @@
       </p:sp>
       <p:sp>
         <p:nvSpPr>
-          <p:cNvPr id="68" name="PlaceHolder 3"/>
+          <p:cNvPr id="69" name="PlaceHolder 3"/>
           <p:cNvSpPr>
             <a:spLocks noGrp="1"/>
           </p:cNvSpPr>
@@ -1465,7 +1465,7 @@
       </p:sp>
       <p:sp>
         <p:nvSpPr>
-          <p:cNvPr id="69" name="PlaceHolder 4"/>
+          <p:cNvPr id="70" name="PlaceHolder 4"/>
           <p:cNvSpPr>
             <a:spLocks noGrp="1"/>
           </p:cNvSpPr>
@@ -1521,7 +1521,7 @@
       </p:grpSpPr>
       <p:sp>
         <p:nvSpPr>
-          <p:cNvPr id="70" name="PlaceHolder 1"/>
+          <p:cNvPr id="71" name="PlaceHolder 1"/>
           <p:cNvSpPr>
             <a:spLocks noGrp="1"/>
           </p:cNvSpPr>
@@ -1558,7 +1558,7 @@
       </p:sp>
       <p:sp>
         <p:nvSpPr>
-          <p:cNvPr id="71" name="PlaceHolder 2"/>
+          <p:cNvPr id="72" name="PlaceHolder 2"/>
           <p:cNvSpPr>
             <a:spLocks noGrp="1"/>
           </p:cNvSpPr>
@@ -1592,7 +1592,7 @@
       </p:sp>
       <p:sp>
         <p:nvSpPr>
-          <p:cNvPr id="72" name="PlaceHolder 3"/>
+          <p:cNvPr id="73" name="PlaceHolder 3"/>
           <p:cNvSpPr>
             <a:spLocks noGrp="1"/>
           </p:cNvSpPr>
@@ -1626,7 +1626,7 @@
       </p:sp>
       <p:sp>
         <p:nvSpPr>
-          <p:cNvPr id="73" name="PlaceHolder 4"/>
+          <p:cNvPr id="74" name="PlaceHolder 4"/>
           <p:cNvSpPr>
             <a:spLocks noGrp="1"/>
           </p:cNvSpPr>
@@ -1682,7 +1682,7 @@
       </p:grpSpPr>
       <p:sp>
         <p:nvSpPr>
-          <p:cNvPr id="74" name="PlaceHolder 1"/>
+          <p:cNvPr id="75" name="PlaceHolder 1"/>
           <p:cNvSpPr>
             <a:spLocks noGrp="1"/>
           </p:cNvSpPr>
@@ -1719,7 +1719,7 @@
       </p:sp>
       <p:sp>
         <p:nvSpPr>
-          <p:cNvPr id="75" name="PlaceHolder 2"/>
+          <p:cNvPr id="76" name="PlaceHolder 2"/>
           <p:cNvSpPr>
             <a:spLocks noGrp="1"/>
           </p:cNvSpPr>
@@ -1753,7 +1753,7 @@
       </p:sp>
       <p:sp>
         <p:nvSpPr>
-          <p:cNvPr id="76" name="PlaceHolder 3"/>
+          <p:cNvPr id="77" name="PlaceHolder 3"/>
           <p:cNvSpPr>
             <a:spLocks noGrp="1"/>
           </p:cNvSpPr>
@@ -1809,7 +1809,7 @@
       </p:grpSpPr>
       <p:sp>
         <p:nvSpPr>
-          <p:cNvPr id="77" name="PlaceHolder 1"/>
+          <p:cNvPr id="78" name="PlaceHolder 1"/>
           <p:cNvSpPr>
             <a:spLocks noGrp="1"/>
           </p:cNvSpPr>
@@ -1846,7 +1846,7 @@
       </p:sp>
       <p:sp>
         <p:nvSpPr>
-          <p:cNvPr id="78" name="PlaceHolder 2"/>
+          <p:cNvPr id="79" name="PlaceHolder 2"/>
           <p:cNvSpPr>
             <a:spLocks noGrp="1"/>
           </p:cNvSpPr>
@@ -1880,7 +1880,7 @@
       </p:sp>
       <p:sp>
         <p:nvSpPr>
-          <p:cNvPr id="79" name="PlaceHolder 3"/>
+          <p:cNvPr id="80" name="PlaceHolder 3"/>
           <p:cNvSpPr>
             <a:spLocks noGrp="1"/>
           </p:cNvSpPr>
@@ -1914,7 +1914,7 @@
       </p:sp>
       <p:sp>
         <p:nvSpPr>
-          <p:cNvPr id="80" name="PlaceHolder 4"/>
+          <p:cNvPr id="81" name="PlaceHolder 4"/>
           <p:cNvSpPr>
             <a:spLocks noGrp="1"/>
           </p:cNvSpPr>
@@ -1948,7 +1948,7 @@
       </p:sp>
       <p:sp>
         <p:nvSpPr>
-          <p:cNvPr id="81" name="PlaceHolder 5"/>
+          <p:cNvPr id="82" name="PlaceHolder 5"/>
           <p:cNvSpPr>
             <a:spLocks noGrp="1"/>
           </p:cNvSpPr>
@@ -2004,7 +2004,7 @@
       </p:grpSpPr>
       <p:sp>
         <p:nvSpPr>
-          <p:cNvPr id="82" name="PlaceHolder 1"/>
+          <p:cNvPr id="83" name="PlaceHolder 1"/>
           <p:cNvSpPr>
             <a:spLocks noGrp="1"/>
           </p:cNvSpPr>
@@ -2041,7 +2041,7 @@
       </p:sp>
       <p:sp>
         <p:nvSpPr>
-          <p:cNvPr id="83" name="PlaceHolder 2"/>
+          <p:cNvPr id="84" name="PlaceHolder 2"/>
           <p:cNvSpPr>
             <a:spLocks noGrp="1"/>
           </p:cNvSpPr>
@@ -2075,7 +2075,7 @@
       </p:sp>
       <p:sp>
         <p:nvSpPr>
-          <p:cNvPr id="84" name="PlaceHolder 3"/>
+          <p:cNvPr id="85" name="PlaceHolder 3"/>
           <p:cNvSpPr>
             <a:spLocks noGrp="1"/>
           </p:cNvSpPr>
@@ -2109,7 +2109,7 @@
       </p:sp>
       <p:sp>
         <p:nvSpPr>
-          <p:cNvPr id="85" name="PlaceHolder 4"/>
+          <p:cNvPr id="86" name="PlaceHolder 4"/>
           <p:cNvSpPr>
             <a:spLocks noGrp="1"/>
           </p:cNvSpPr>
@@ -2143,7 +2143,7 @@
       </p:sp>
       <p:sp>
         <p:nvSpPr>
-          <p:cNvPr id="86" name="PlaceHolder 5"/>
+          <p:cNvPr id="87" name="PlaceHolder 5"/>
           <p:cNvSpPr>
             <a:spLocks noGrp="1"/>
           </p:cNvSpPr>
@@ -2177,7 +2177,7 @@
       </p:sp>
       <p:sp>
         <p:nvSpPr>
-          <p:cNvPr id="87" name="PlaceHolder 6"/>
+          <p:cNvPr id="88" name="PlaceHolder 6"/>
           <p:cNvSpPr>
             <a:spLocks noGrp="1"/>
           </p:cNvSpPr>
@@ -2211,7 +2211,7 @@
       </p:sp>
       <p:sp>
         <p:nvSpPr>
-          <p:cNvPr id="88" name="PlaceHolder 7"/>
+          <p:cNvPr id="89" name="PlaceHolder 7"/>
           <p:cNvSpPr>
             <a:spLocks noGrp="1"/>
           </p:cNvSpPr>
@@ -2289,7 +2289,7 @@
       </p:grpSpPr>
       <p:sp>
         <p:nvSpPr>
-          <p:cNvPr id="94" name="PlaceHolder 1"/>
+          <p:cNvPr id="96" name="PlaceHolder 1"/>
           <p:cNvSpPr>
             <a:spLocks noGrp="1"/>
           </p:cNvSpPr>
@@ -2326,7 +2326,7 @@
       </p:sp>
       <p:sp>
         <p:nvSpPr>
-          <p:cNvPr id="95" name="PlaceHolder 2"/>
+          <p:cNvPr id="97" name="PlaceHolder 2"/>
           <p:cNvSpPr>
             <a:spLocks noGrp="1"/>
           </p:cNvSpPr>
@@ -2385,7 +2385,7 @@
       </p:grpSpPr>
       <p:sp>
         <p:nvSpPr>
-          <p:cNvPr id="96" name="PlaceHolder 1"/>
+          <p:cNvPr id="98" name="PlaceHolder 1"/>
           <p:cNvSpPr>
             <a:spLocks noGrp="1"/>
           </p:cNvSpPr>
@@ -2422,7 +2422,7 @@
       </p:sp>
       <p:sp>
         <p:nvSpPr>
-          <p:cNvPr id="97" name="PlaceHolder 2"/>
+          <p:cNvPr id="99" name="PlaceHolder 2"/>
           <p:cNvSpPr>
             <a:spLocks noGrp="1"/>
           </p:cNvSpPr>
@@ -2478,7 +2478,7 @@
       </p:grpSpPr>
       <p:sp>
         <p:nvSpPr>
-          <p:cNvPr id="98" name="PlaceHolder 1"/>
+          <p:cNvPr id="100" name="PlaceHolder 1"/>
           <p:cNvSpPr>
             <a:spLocks noGrp="1"/>
           </p:cNvSpPr>
@@ -2515,7 +2515,7 @@
       </p:sp>
       <p:sp>
         <p:nvSpPr>
-          <p:cNvPr id="99" name="PlaceHolder 2"/>
+          <p:cNvPr id="101" name="PlaceHolder 2"/>
           <p:cNvSpPr>
             <a:spLocks noGrp="1"/>
           </p:cNvSpPr>
@@ -2549,7 +2549,7 @@
       </p:sp>
       <p:sp>
         <p:nvSpPr>
-          <p:cNvPr id="100" name="PlaceHolder 3"/>
+          <p:cNvPr id="102" name="PlaceHolder 3"/>
           <p:cNvSpPr>
             <a:spLocks noGrp="1"/>
           </p:cNvSpPr>
@@ -2605,7 +2605,7 @@
       </p:grpSpPr>
       <p:sp>
         <p:nvSpPr>
-          <p:cNvPr id="101" name="PlaceHolder 1"/>
+          <p:cNvPr id="103" name="PlaceHolder 1"/>
           <p:cNvSpPr>
             <a:spLocks noGrp="1"/>
           </p:cNvSpPr>
@@ -2664,7 +2664,7 @@
       </p:grpSpPr>
       <p:sp>
         <p:nvSpPr>
-          <p:cNvPr id="10" name="PlaceHolder 1"/>
+          <p:cNvPr id="11" name="PlaceHolder 1"/>
           <p:cNvSpPr>
             <a:spLocks noGrp="1"/>
           </p:cNvSpPr>
@@ -2701,7 +2701,7 @@
       </p:sp>
       <p:sp>
         <p:nvSpPr>
-          <p:cNvPr id="11" name="PlaceHolder 2"/>
+          <p:cNvPr id="12" name="PlaceHolder 2"/>
           <p:cNvSpPr>
             <a:spLocks noGrp="1"/>
           </p:cNvSpPr>
@@ -2757,7 +2757,7 @@
       </p:grpSpPr>
       <p:sp>
         <p:nvSpPr>
-          <p:cNvPr id="102" name="PlaceHolder 1"/>
+          <p:cNvPr id="104" name="PlaceHolder 1"/>
           <p:cNvSpPr>
             <a:spLocks noGrp="1"/>
           </p:cNvSpPr>
@@ -2816,7 +2816,7 @@
       </p:grpSpPr>
       <p:sp>
         <p:nvSpPr>
-          <p:cNvPr id="103" name="PlaceHolder 1"/>
+          <p:cNvPr id="105" name="PlaceHolder 1"/>
           <p:cNvSpPr>
             <a:spLocks noGrp="1"/>
           </p:cNvSpPr>
@@ -2853,7 +2853,7 @@
       </p:sp>
       <p:sp>
         <p:nvSpPr>
-          <p:cNvPr id="104" name="PlaceHolder 2"/>
+          <p:cNvPr id="106" name="PlaceHolder 2"/>
           <p:cNvSpPr>
             <a:spLocks noGrp="1"/>
           </p:cNvSpPr>
@@ -2887,7 +2887,7 @@
       </p:sp>
       <p:sp>
         <p:nvSpPr>
-          <p:cNvPr id="105" name="PlaceHolder 3"/>
+          <p:cNvPr id="107" name="PlaceHolder 3"/>
           <p:cNvSpPr>
             <a:spLocks noGrp="1"/>
           </p:cNvSpPr>
@@ -2921,7 +2921,7 @@
       </p:sp>
       <p:sp>
         <p:nvSpPr>
-          <p:cNvPr id="106" name="PlaceHolder 4"/>
+          <p:cNvPr id="108" name="PlaceHolder 4"/>
           <p:cNvSpPr>
             <a:spLocks noGrp="1"/>
           </p:cNvSpPr>
@@ -2977,7 +2977,7 @@
       </p:grpSpPr>
       <p:sp>
         <p:nvSpPr>
-          <p:cNvPr id="107" name="PlaceHolder 1"/>
+          <p:cNvPr id="109" name="PlaceHolder 1"/>
           <p:cNvSpPr>
             <a:spLocks noGrp="1"/>
           </p:cNvSpPr>
@@ -3014,7 +3014,7 @@
       </p:sp>
       <p:sp>
         <p:nvSpPr>
-          <p:cNvPr id="108" name="PlaceHolder 2"/>
+          <p:cNvPr id="110" name="PlaceHolder 2"/>
           <p:cNvSpPr>
             <a:spLocks noGrp="1"/>
           </p:cNvSpPr>
@@ -3048,7 +3048,7 @@
       </p:sp>
       <p:sp>
         <p:nvSpPr>
-          <p:cNvPr id="109" name="PlaceHolder 3"/>
+          <p:cNvPr id="111" name="PlaceHolder 3"/>
           <p:cNvSpPr>
             <a:spLocks noGrp="1"/>
           </p:cNvSpPr>
@@ -3082,7 +3082,7 @@
       </p:sp>
       <p:sp>
         <p:nvSpPr>
-          <p:cNvPr id="110" name="PlaceHolder 4"/>
+          <p:cNvPr id="112" name="PlaceHolder 4"/>
           <p:cNvSpPr>
             <a:spLocks noGrp="1"/>
           </p:cNvSpPr>
@@ -3138,7 +3138,7 @@
       </p:grpSpPr>
       <p:sp>
         <p:nvSpPr>
-          <p:cNvPr id="111" name="PlaceHolder 1"/>
+          <p:cNvPr id="113" name="PlaceHolder 1"/>
           <p:cNvSpPr>
             <a:spLocks noGrp="1"/>
           </p:cNvSpPr>
@@ -3175,7 +3175,7 @@
       </p:sp>
       <p:sp>
         <p:nvSpPr>
-          <p:cNvPr id="112" name="PlaceHolder 2"/>
+          <p:cNvPr id="114" name="PlaceHolder 2"/>
           <p:cNvSpPr>
             <a:spLocks noGrp="1"/>
           </p:cNvSpPr>
@@ -3209,7 +3209,7 @@
       </p:sp>
       <p:sp>
         <p:nvSpPr>
-          <p:cNvPr id="113" name="PlaceHolder 3"/>
+          <p:cNvPr id="115" name="PlaceHolder 3"/>
           <p:cNvSpPr>
             <a:spLocks noGrp="1"/>
           </p:cNvSpPr>
@@ -3243,7 +3243,7 @@
       </p:sp>
       <p:sp>
         <p:nvSpPr>
-          <p:cNvPr id="114" name="PlaceHolder 4"/>
+          <p:cNvPr id="116" name="PlaceHolder 4"/>
           <p:cNvSpPr>
             <a:spLocks noGrp="1"/>
           </p:cNvSpPr>
@@ -3299,7 +3299,7 @@
       </p:grpSpPr>
       <p:sp>
         <p:nvSpPr>
-          <p:cNvPr id="115" name="PlaceHolder 1"/>
+          <p:cNvPr id="117" name="PlaceHolder 1"/>
           <p:cNvSpPr>
             <a:spLocks noGrp="1"/>
           </p:cNvSpPr>
@@ -3336,7 +3336,7 @@
       </p:sp>
       <p:sp>
         <p:nvSpPr>
-          <p:cNvPr id="116" name="PlaceHolder 2"/>
+          <p:cNvPr id="118" name="PlaceHolder 2"/>
           <p:cNvSpPr>
             <a:spLocks noGrp="1"/>
           </p:cNvSpPr>
@@ -3370,7 +3370,7 @@
       </p:sp>
       <p:sp>
         <p:nvSpPr>
-          <p:cNvPr id="117" name="PlaceHolder 3"/>
+          <p:cNvPr id="119" name="PlaceHolder 3"/>
           <p:cNvSpPr>
             <a:spLocks noGrp="1"/>
           </p:cNvSpPr>
@@ -3426,7 +3426,7 @@
       </p:grpSpPr>
       <p:sp>
         <p:nvSpPr>
-          <p:cNvPr id="118" name="PlaceHolder 1"/>
+          <p:cNvPr id="120" name="PlaceHolder 1"/>
           <p:cNvSpPr>
             <a:spLocks noGrp="1"/>
           </p:cNvSpPr>
@@ -3463,7 +3463,7 @@
       </p:sp>
       <p:sp>
         <p:nvSpPr>
-          <p:cNvPr id="119" name="PlaceHolder 2"/>
+          <p:cNvPr id="121" name="PlaceHolder 2"/>
           <p:cNvSpPr>
             <a:spLocks noGrp="1"/>
           </p:cNvSpPr>
@@ -3497,7 +3497,7 @@
       </p:sp>
       <p:sp>
         <p:nvSpPr>
-          <p:cNvPr id="120" name="PlaceHolder 3"/>
+          <p:cNvPr id="122" name="PlaceHolder 3"/>
           <p:cNvSpPr>
             <a:spLocks noGrp="1"/>
           </p:cNvSpPr>
@@ -3531,7 +3531,7 @@
       </p:sp>
       <p:sp>
         <p:nvSpPr>
-          <p:cNvPr id="121" name="PlaceHolder 4"/>
+          <p:cNvPr id="123" name="PlaceHolder 4"/>
           <p:cNvSpPr>
             <a:spLocks noGrp="1"/>
           </p:cNvSpPr>
@@ -3565,7 +3565,7 @@
       </p:sp>
       <p:sp>
         <p:nvSpPr>
-          <p:cNvPr id="122" name="PlaceHolder 5"/>
+          <p:cNvPr id="124" name="PlaceHolder 5"/>
           <p:cNvSpPr>
             <a:spLocks noGrp="1"/>
           </p:cNvSpPr>
@@ -3621,7 +3621,7 @@
       </p:grpSpPr>
       <p:sp>
         <p:nvSpPr>
-          <p:cNvPr id="123" name="PlaceHolder 1"/>
+          <p:cNvPr id="125" name="PlaceHolder 1"/>
           <p:cNvSpPr>
             <a:spLocks noGrp="1"/>
           </p:cNvSpPr>
@@ -3658,7 +3658,7 @@
       </p:sp>
       <p:sp>
         <p:nvSpPr>
-          <p:cNvPr id="124" name="PlaceHolder 2"/>
+          <p:cNvPr id="126" name="PlaceHolder 2"/>
           <p:cNvSpPr>
             <a:spLocks noGrp="1"/>
           </p:cNvSpPr>
@@ -3692,7 +3692,7 @@
       </p:sp>
       <p:sp>
         <p:nvSpPr>
-          <p:cNvPr id="125" name="PlaceHolder 3"/>
+          <p:cNvPr id="127" name="PlaceHolder 3"/>
           <p:cNvSpPr>
             <a:spLocks noGrp="1"/>
           </p:cNvSpPr>
@@ -3726,7 +3726,7 @@
       </p:sp>
       <p:sp>
         <p:nvSpPr>
-          <p:cNvPr id="126" name="PlaceHolder 4"/>
+          <p:cNvPr id="128" name="PlaceHolder 4"/>
           <p:cNvSpPr>
             <a:spLocks noGrp="1"/>
           </p:cNvSpPr>
@@ -3760,7 +3760,7 @@
       </p:sp>
       <p:sp>
         <p:nvSpPr>
-          <p:cNvPr id="127" name="PlaceHolder 5"/>
+          <p:cNvPr id="129" name="PlaceHolder 5"/>
           <p:cNvSpPr>
             <a:spLocks noGrp="1"/>
           </p:cNvSpPr>
@@ -3794,7 +3794,7 @@
       </p:sp>
       <p:sp>
         <p:nvSpPr>
-          <p:cNvPr id="128" name="PlaceHolder 6"/>
+          <p:cNvPr id="130" name="PlaceHolder 6"/>
           <p:cNvSpPr>
             <a:spLocks noGrp="1"/>
           </p:cNvSpPr>
@@ -3828,7 +3828,7 @@
       </p:sp>
       <p:sp>
         <p:nvSpPr>
-          <p:cNvPr id="129" name="PlaceHolder 7"/>
+          <p:cNvPr id="131" name="PlaceHolder 7"/>
           <p:cNvSpPr>
             <a:spLocks noGrp="1"/>
           </p:cNvSpPr>
@@ -3906,7 +3906,7 @@
       </p:grpSpPr>
       <p:sp>
         <p:nvSpPr>
-          <p:cNvPr id="136" name="PlaceHolder 1"/>
+          <p:cNvPr id="138" name="PlaceHolder 1"/>
           <p:cNvSpPr>
             <a:spLocks noGrp="1"/>
           </p:cNvSpPr>
@@ -3943,7 +3943,7 @@
       </p:sp>
       <p:sp>
         <p:nvSpPr>
-          <p:cNvPr id="137" name="PlaceHolder 2"/>
+          <p:cNvPr id="139" name="PlaceHolder 2"/>
           <p:cNvSpPr>
             <a:spLocks noGrp="1"/>
           </p:cNvSpPr>
@@ -4002,7 +4002,7 @@
       </p:grpSpPr>
       <p:sp>
         <p:nvSpPr>
-          <p:cNvPr id="138" name="PlaceHolder 1"/>
+          <p:cNvPr id="140" name="PlaceHolder 1"/>
           <p:cNvSpPr>
             <a:spLocks noGrp="1"/>
           </p:cNvSpPr>
@@ -4039,7 +4039,7 @@
       </p:sp>
       <p:sp>
         <p:nvSpPr>
-          <p:cNvPr id="139" name="PlaceHolder 2"/>
+          <p:cNvPr id="141" name="PlaceHolder 2"/>
           <p:cNvSpPr>
             <a:spLocks noGrp="1"/>
           </p:cNvSpPr>
@@ -4095,7 +4095,7 @@
       </p:grpSpPr>
       <p:sp>
         <p:nvSpPr>
-          <p:cNvPr id="12" name="PlaceHolder 1"/>
+          <p:cNvPr id="13" name="PlaceHolder 1"/>
           <p:cNvSpPr>
             <a:spLocks noGrp="1"/>
           </p:cNvSpPr>
@@ -4132,7 +4132,7 @@
       </p:sp>
       <p:sp>
         <p:nvSpPr>
-          <p:cNvPr id="13" name="PlaceHolder 2"/>
+          <p:cNvPr id="14" name="PlaceHolder 2"/>
           <p:cNvSpPr>
             <a:spLocks noGrp="1"/>
           </p:cNvSpPr>
@@ -4166,7 +4166,7 @@
       </p:sp>
       <p:sp>
         <p:nvSpPr>
-          <p:cNvPr id="14" name="PlaceHolder 3"/>
+          <p:cNvPr id="15" name="PlaceHolder 3"/>
           <p:cNvSpPr>
             <a:spLocks noGrp="1"/>
           </p:cNvSpPr>
@@ -4222,7 +4222,7 @@
       </p:grpSpPr>
       <p:sp>
         <p:nvSpPr>
-          <p:cNvPr id="140" name="PlaceHolder 1"/>
+          <p:cNvPr id="142" name="PlaceHolder 1"/>
           <p:cNvSpPr>
             <a:spLocks noGrp="1"/>
           </p:cNvSpPr>
@@ -4259,7 +4259,7 @@
       </p:sp>
       <p:sp>
         <p:nvSpPr>
-          <p:cNvPr id="141" name="PlaceHolder 2"/>
+          <p:cNvPr id="143" name="PlaceHolder 2"/>
           <p:cNvSpPr>
             <a:spLocks noGrp="1"/>
           </p:cNvSpPr>
@@ -4293,7 +4293,7 @@
       </p:sp>
       <p:sp>
         <p:nvSpPr>
-          <p:cNvPr id="142" name="PlaceHolder 3"/>
+          <p:cNvPr id="144" name="PlaceHolder 3"/>
           <p:cNvSpPr>
             <a:spLocks noGrp="1"/>
           </p:cNvSpPr>
@@ -4349,7 +4349,7 @@
       </p:grpSpPr>
       <p:sp>
         <p:nvSpPr>
-          <p:cNvPr id="143" name="PlaceHolder 1"/>
+          <p:cNvPr id="145" name="PlaceHolder 1"/>
           <p:cNvSpPr>
             <a:spLocks noGrp="1"/>
           </p:cNvSpPr>
@@ -4408,7 +4408,7 @@
       </p:grpSpPr>
       <p:sp>
         <p:nvSpPr>
-          <p:cNvPr id="144" name="PlaceHolder 1"/>
+          <p:cNvPr id="146" name="PlaceHolder 1"/>
           <p:cNvSpPr>
             <a:spLocks noGrp="1"/>
           </p:cNvSpPr>
@@ -4467,7 +4467,7 @@
       </p:grpSpPr>
       <p:sp>
         <p:nvSpPr>
-          <p:cNvPr id="145" name="PlaceHolder 1"/>
+          <p:cNvPr id="147" name="PlaceHolder 1"/>
           <p:cNvSpPr>
             <a:spLocks noGrp="1"/>
           </p:cNvSpPr>
@@ -4504,7 +4504,7 @@
       </p:sp>
       <p:sp>
         <p:nvSpPr>
-          <p:cNvPr id="146" name="PlaceHolder 2"/>
+          <p:cNvPr id="148" name="PlaceHolder 2"/>
           <p:cNvSpPr>
             <a:spLocks noGrp="1"/>
           </p:cNvSpPr>
@@ -4538,7 +4538,7 @@
       </p:sp>
       <p:sp>
         <p:nvSpPr>
-          <p:cNvPr id="147" name="PlaceHolder 3"/>
+          <p:cNvPr id="149" name="PlaceHolder 3"/>
           <p:cNvSpPr>
             <a:spLocks noGrp="1"/>
           </p:cNvSpPr>
@@ -4572,7 +4572,7 @@
       </p:sp>
       <p:sp>
         <p:nvSpPr>
-          <p:cNvPr id="148" name="PlaceHolder 4"/>
+          <p:cNvPr id="150" name="PlaceHolder 4"/>
           <p:cNvSpPr>
             <a:spLocks noGrp="1"/>
           </p:cNvSpPr>
@@ -4628,7 +4628,7 @@
       </p:grpSpPr>
       <p:sp>
         <p:nvSpPr>
-          <p:cNvPr id="149" name="PlaceHolder 1"/>
+          <p:cNvPr id="151" name="PlaceHolder 1"/>
           <p:cNvSpPr>
             <a:spLocks noGrp="1"/>
           </p:cNvSpPr>
@@ -4665,7 +4665,7 @@
       </p:sp>
       <p:sp>
         <p:nvSpPr>
-          <p:cNvPr id="150" name="PlaceHolder 2"/>
+          <p:cNvPr id="152" name="PlaceHolder 2"/>
           <p:cNvSpPr>
             <a:spLocks noGrp="1"/>
           </p:cNvSpPr>
@@ -4699,7 +4699,7 @@
       </p:sp>
       <p:sp>
         <p:nvSpPr>
-          <p:cNvPr id="151" name="PlaceHolder 3"/>
+          <p:cNvPr id="153" name="PlaceHolder 3"/>
           <p:cNvSpPr>
             <a:spLocks noGrp="1"/>
           </p:cNvSpPr>
@@ -4733,7 +4733,7 @@
       </p:sp>
       <p:sp>
         <p:nvSpPr>
-          <p:cNvPr id="152" name="PlaceHolder 4"/>
+          <p:cNvPr id="154" name="PlaceHolder 4"/>
           <p:cNvSpPr>
             <a:spLocks noGrp="1"/>
           </p:cNvSpPr>
@@ -4789,7 +4789,7 @@
       </p:grpSpPr>
       <p:sp>
         <p:nvSpPr>
-          <p:cNvPr id="153" name="PlaceHolder 1"/>
+          <p:cNvPr id="155" name="PlaceHolder 1"/>
           <p:cNvSpPr>
             <a:spLocks noGrp="1"/>
           </p:cNvSpPr>
@@ -4826,7 +4826,7 @@
       </p:sp>
       <p:sp>
         <p:nvSpPr>
-          <p:cNvPr id="154" name="PlaceHolder 2"/>
+          <p:cNvPr id="156" name="PlaceHolder 2"/>
           <p:cNvSpPr>
             <a:spLocks noGrp="1"/>
           </p:cNvSpPr>
@@ -4860,7 +4860,7 @@
       </p:sp>
       <p:sp>
         <p:nvSpPr>
-          <p:cNvPr id="155" name="PlaceHolder 3"/>
+          <p:cNvPr id="157" name="PlaceHolder 3"/>
           <p:cNvSpPr>
             <a:spLocks noGrp="1"/>
           </p:cNvSpPr>
@@ -4894,7 +4894,7 @@
       </p:sp>
       <p:sp>
         <p:nvSpPr>
-          <p:cNvPr id="156" name="PlaceHolder 4"/>
+          <p:cNvPr id="158" name="PlaceHolder 4"/>
           <p:cNvSpPr>
             <a:spLocks noGrp="1"/>
           </p:cNvSpPr>
@@ -4950,7 +4950,7 @@
       </p:grpSpPr>
       <p:sp>
         <p:nvSpPr>
-          <p:cNvPr id="157" name="PlaceHolder 1"/>
+          <p:cNvPr id="159" name="PlaceHolder 1"/>
           <p:cNvSpPr>
             <a:spLocks noGrp="1"/>
           </p:cNvSpPr>
@@ -4987,7 +4987,7 @@
       </p:sp>
       <p:sp>
         <p:nvSpPr>
-          <p:cNvPr id="158" name="PlaceHolder 2"/>
+          <p:cNvPr id="160" name="PlaceHolder 2"/>
           <p:cNvSpPr>
             <a:spLocks noGrp="1"/>
           </p:cNvSpPr>
@@ -5021,7 +5021,7 @@
       </p:sp>
       <p:sp>
         <p:nvSpPr>
-          <p:cNvPr id="159" name="PlaceHolder 3"/>
+          <p:cNvPr id="161" name="PlaceHolder 3"/>
           <p:cNvSpPr>
             <a:spLocks noGrp="1"/>
           </p:cNvSpPr>
@@ -5077,7 +5077,7 @@
       </p:grpSpPr>
       <p:sp>
         <p:nvSpPr>
-          <p:cNvPr id="160" name="PlaceHolder 1"/>
+          <p:cNvPr id="162" name="PlaceHolder 1"/>
           <p:cNvSpPr>
             <a:spLocks noGrp="1"/>
           </p:cNvSpPr>
@@ -5114,7 +5114,7 @@
       </p:sp>
       <p:sp>
         <p:nvSpPr>
-          <p:cNvPr id="161" name="PlaceHolder 2"/>
+          <p:cNvPr id="163" name="PlaceHolder 2"/>
           <p:cNvSpPr>
             <a:spLocks noGrp="1"/>
           </p:cNvSpPr>
@@ -5148,7 +5148,7 @@
       </p:sp>
       <p:sp>
         <p:nvSpPr>
-          <p:cNvPr id="162" name="PlaceHolder 3"/>
+          <p:cNvPr id="164" name="PlaceHolder 3"/>
           <p:cNvSpPr>
             <a:spLocks noGrp="1"/>
           </p:cNvSpPr>
@@ -5182,7 +5182,7 @@
       </p:sp>
       <p:sp>
         <p:nvSpPr>
-          <p:cNvPr id="163" name="PlaceHolder 4"/>
+          <p:cNvPr id="165" name="PlaceHolder 4"/>
           <p:cNvSpPr>
             <a:spLocks noGrp="1"/>
           </p:cNvSpPr>
@@ -5216,7 +5216,7 @@
       </p:sp>
       <p:sp>
         <p:nvSpPr>
-          <p:cNvPr id="164" name="PlaceHolder 5"/>
+          <p:cNvPr id="166" name="PlaceHolder 5"/>
           <p:cNvSpPr>
             <a:spLocks noGrp="1"/>
           </p:cNvSpPr>
@@ -5272,7 +5272,7 @@
       </p:grpSpPr>
       <p:sp>
         <p:nvSpPr>
-          <p:cNvPr id="165" name="PlaceHolder 1"/>
+          <p:cNvPr id="167" name="PlaceHolder 1"/>
           <p:cNvSpPr>
             <a:spLocks noGrp="1"/>
           </p:cNvSpPr>
@@ -5309,7 +5309,7 @@
       </p:sp>
       <p:sp>
         <p:nvSpPr>
-          <p:cNvPr id="166" name="PlaceHolder 2"/>
+          <p:cNvPr id="168" name="PlaceHolder 2"/>
           <p:cNvSpPr>
             <a:spLocks noGrp="1"/>
           </p:cNvSpPr>
@@ -5343,7 +5343,7 @@
       </p:sp>
       <p:sp>
         <p:nvSpPr>
-          <p:cNvPr id="167" name="PlaceHolder 3"/>
+          <p:cNvPr id="169" name="PlaceHolder 3"/>
           <p:cNvSpPr>
             <a:spLocks noGrp="1"/>
           </p:cNvSpPr>
@@ -5377,7 +5377,7 @@
       </p:sp>
       <p:sp>
         <p:nvSpPr>
-          <p:cNvPr id="168" name="PlaceHolder 4"/>
+          <p:cNvPr id="170" name="PlaceHolder 4"/>
           <p:cNvSpPr>
             <a:spLocks noGrp="1"/>
           </p:cNvSpPr>
@@ -5411,7 +5411,7 @@
       </p:sp>
       <p:sp>
         <p:nvSpPr>
-          <p:cNvPr id="169" name="PlaceHolder 5"/>
+          <p:cNvPr id="171" name="PlaceHolder 5"/>
           <p:cNvSpPr>
             <a:spLocks noGrp="1"/>
           </p:cNvSpPr>
@@ -5445,7 +5445,7 @@
       </p:sp>
       <p:sp>
         <p:nvSpPr>
-          <p:cNvPr id="170" name="PlaceHolder 6"/>
+          <p:cNvPr id="172" name="PlaceHolder 6"/>
           <p:cNvSpPr>
             <a:spLocks noGrp="1"/>
           </p:cNvSpPr>
@@ -5479,7 +5479,7 @@
       </p:sp>
       <p:sp>
         <p:nvSpPr>
-          <p:cNvPr id="171" name="PlaceHolder 7"/>
+          <p:cNvPr id="173" name="PlaceHolder 7"/>
           <p:cNvSpPr>
             <a:spLocks noGrp="1"/>
           </p:cNvSpPr>
@@ -5557,7 +5557,7 @@
       </p:grpSpPr>
       <p:sp>
         <p:nvSpPr>
-          <p:cNvPr id="15" name="PlaceHolder 1"/>
+          <p:cNvPr id="16" name="PlaceHolder 1"/>
           <p:cNvSpPr>
             <a:spLocks noGrp="1"/>
           </p:cNvSpPr>
@@ -5616,7 +5616,7 @@
       </p:grpSpPr>
       <p:sp>
         <p:nvSpPr>
-          <p:cNvPr id="178" name="PlaceHolder 1"/>
+          <p:cNvPr id="180" name="PlaceHolder 1"/>
           <p:cNvSpPr>
             <a:spLocks noGrp="1"/>
           </p:cNvSpPr>
@@ -5653,7 +5653,7 @@
       </p:sp>
       <p:sp>
         <p:nvSpPr>
-          <p:cNvPr id="179" name="PlaceHolder 2"/>
+          <p:cNvPr id="181" name="PlaceHolder 2"/>
           <p:cNvSpPr>
             <a:spLocks noGrp="1"/>
           </p:cNvSpPr>
@@ -5712,7 +5712,7 @@
       </p:grpSpPr>
       <p:sp>
         <p:nvSpPr>
-          <p:cNvPr id="180" name="PlaceHolder 1"/>
+          <p:cNvPr id="182" name="PlaceHolder 1"/>
           <p:cNvSpPr>
             <a:spLocks noGrp="1"/>
           </p:cNvSpPr>
@@ -5749,7 +5749,7 @@
       </p:sp>
       <p:sp>
         <p:nvSpPr>
-          <p:cNvPr id="181" name="PlaceHolder 2"/>
+          <p:cNvPr id="183" name="PlaceHolder 2"/>
           <p:cNvSpPr>
             <a:spLocks noGrp="1"/>
           </p:cNvSpPr>
@@ -5805,7 +5805,7 @@
       </p:grpSpPr>
       <p:sp>
         <p:nvSpPr>
-          <p:cNvPr id="182" name="PlaceHolder 1"/>
+          <p:cNvPr id="184" name="PlaceHolder 1"/>
           <p:cNvSpPr>
             <a:spLocks noGrp="1"/>
           </p:cNvSpPr>
@@ -5842,7 +5842,7 @@
       </p:sp>
       <p:sp>
         <p:nvSpPr>
-          <p:cNvPr id="183" name="PlaceHolder 2"/>
+          <p:cNvPr id="185" name="PlaceHolder 2"/>
           <p:cNvSpPr>
             <a:spLocks noGrp="1"/>
           </p:cNvSpPr>
@@ -5876,7 +5876,7 @@
       </p:sp>
       <p:sp>
         <p:nvSpPr>
-          <p:cNvPr id="184" name="PlaceHolder 3"/>
+          <p:cNvPr id="186" name="PlaceHolder 3"/>
           <p:cNvSpPr>
             <a:spLocks noGrp="1"/>
           </p:cNvSpPr>
@@ -5932,7 +5932,7 @@
       </p:grpSpPr>
       <p:sp>
         <p:nvSpPr>
-          <p:cNvPr id="185" name="PlaceHolder 1"/>
+          <p:cNvPr id="187" name="PlaceHolder 1"/>
           <p:cNvSpPr>
             <a:spLocks noGrp="1"/>
           </p:cNvSpPr>
@@ -5991,7 +5991,7 @@
       </p:grpSpPr>
       <p:sp>
         <p:nvSpPr>
-          <p:cNvPr id="186" name="PlaceHolder 1"/>
+          <p:cNvPr id="188" name="PlaceHolder 1"/>
           <p:cNvSpPr>
             <a:spLocks noGrp="1"/>
           </p:cNvSpPr>
@@ -6050,7 +6050,7 @@
       </p:grpSpPr>
       <p:sp>
         <p:nvSpPr>
-          <p:cNvPr id="187" name="PlaceHolder 1"/>
+          <p:cNvPr id="189" name="PlaceHolder 1"/>
           <p:cNvSpPr>
             <a:spLocks noGrp="1"/>
           </p:cNvSpPr>
@@ -6087,7 +6087,7 @@
       </p:sp>
       <p:sp>
         <p:nvSpPr>
-          <p:cNvPr id="188" name="PlaceHolder 2"/>
+          <p:cNvPr id="190" name="PlaceHolder 2"/>
           <p:cNvSpPr>
             <a:spLocks noGrp="1"/>
           </p:cNvSpPr>
@@ -6121,7 +6121,7 @@
       </p:sp>
       <p:sp>
         <p:nvSpPr>
-          <p:cNvPr id="189" name="PlaceHolder 3"/>
+          <p:cNvPr id="191" name="PlaceHolder 3"/>
           <p:cNvSpPr>
             <a:spLocks noGrp="1"/>
           </p:cNvSpPr>
@@ -6155,7 +6155,7 @@
       </p:sp>
       <p:sp>
         <p:nvSpPr>
-          <p:cNvPr id="190" name="PlaceHolder 4"/>
+          <p:cNvPr id="192" name="PlaceHolder 4"/>
           <p:cNvSpPr>
             <a:spLocks noGrp="1"/>
           </p:cNvSpPr>
@@ -6211,7 +6211,7 @@
       </p:grpSpPr>
       <p:sp>
         <p:nvSpPr>
-          <p:cNvPr id="191" name="PlaceHolder 1"/>
+          <p:cNvPr id="193" name="PlaceHolder 1"/>
           <p:cNvSpPr>
             <a:spLocks noGrp="1"/>
           </p:cNvSpPr>
@@ -6248,7 +6248,7 @@
       </p:sp>
       <p:sp>
         <p:nvSpPr>
-          <p:cNvPr id="192" name="PlaceHolder 2"/>
+          <p:cNvPr id="194" name="PlaceHolder 2"/>
           <p:cNvSpPr>
             <a:spLocks noGrp="1"/>
           </p:cNvSpPr>
@@ -6282,7 +6282,7 @@
       </p:sp>
       <p:sp>
         <p:nvSpPr>
-          <p:cNvPr id="193" name="PlaceHolder 3"/>
+          <p:cNvPr id="195" name="PlaceHolder 3"/>
           <p:cNvSpPr>
             <a:spLocks noGrp="1"/>
           </p:cNvSpPr>
@@ -6316,7 +6316,7 @@
       </p:sp>
       <p:sp>
         <p:nvSpPr>
-          <p:cNvPr id="194" name="PlaceHolder 4"/>
+          <p:cNvPr id="196" name="PlaceHolder 4"/>
           <p:cNvSpPr>
             <a:spLocks noGrp="1"/>
           </p:cNvSpPr>
@@ -6372,7 +6372,7 @@
       </p:grpSpPr>
       <p:sp>
         <p:nvSpPr>
-          <p:cNvPr id="195" name="PlaceHolder 1"/>
+          <p:cNvPr id="197" name="PlaceHolder 1"/>
           <p:cNvSpPr>
             <a:spLocks noGrp="1"/>
           </p:cNvSpPr>
@@ -6409,7 +6409,7 @@
       </p:sp>
       <p:sp>
         <p:nvSpPr>
-          <p:cNvPr id="196" name="PlaceHolder 2"/>
+          <p:cNvPr id="198" name="PlaceHolder 2"/>
           <p:cNvSpPr>
             <a:spLocks noGrp="1"/>
           </p:cNvSpPr>
@@ -6443,7 +6443,7 @@
       </p:sp>
       <p:sp>
         <p:nvSpPr>
-          <p:cNvPr id="197" name="PlaceHolder 3"/>
+          <p:cNvPr id="199" name="PlaceHolder 3"/>
           <p:cNvSpPr>
             <a:spLocks noGrp="1"/>
           </p:cNvSpPr>
@@ -6477,7 +6477,7 @@
       </p:sp>
       <p:sp>
         <p:nvSpPr>
-          <p:cNvPr id="198" name="PlaceHolder 4"/>
+          <p:cNvPr id="200" name="PlaceHolder 4"/>
           <p:cNvSpPr>
             <a:spLocks noGrp="1"/>
           </p:cNvSpPr>
@@ -6533,7 +6533,7 @@
       </p:grpSpPr>
       <p:sp>
         <p:nvSpPr>
-          <p:cNvPr id="199" name="PlaceHolder 1"/>
+          <p:cNvPr id="201" name="PlaceHolder 1"/>
           <p:cNvSpPr>
             <a:spLocks noGrp="1"/>
           </p:cNvSpPr>
@@ -6570,7 +6570,7 @@
       </p:sp>
       <p:sp>
         <p:nvSpPr>
-          <p:cNvPr id="200" name="PlaceHolder 2"/>
+          <p:cNvPr id="202" name="PlaceHolder 2"/>
           <p:cNvSpPr>
             <a:spLocks noGrp="1"/>
           </p:cNvSpPr>
@@ -6604,7 +6604,7 @@
       </p:sp>
       <p:sp>
         <p:nvSpPr>
-          <p:cNvPr id="201" name="PlaceHolder 3"/>
+          <p:cNvPr id="203" name="PlaceHolder 3"/>
           <p:cNvSpPr>
             <a:spLocks noGrp="1"/>
           </p:cNvSpPr>
@@ -6660,7 +6660,7 @@
       </p:grpSpPr>
       <p:sp>
         <p:nvSpPr>
-          <p:cNvPr id="202" name="PlaceHolder 1"/>
+          <p:cNvPr id="204" name="PlaceHolder 1"/>
           <p:cNvSpPr>
             <a:spLocks noGrp="1"/>
           </p:cNvSpPr>
@@ -6697,7 +6697,7 @@
       </p:sp>
       <p:sp>
         <p:nvSpPr>
-          <p:cNvPr id="203" name="PlaceHolder 2"/>
+          <p:cNvPr id="205" name="PlaceHolder 2"/>
           <p:cNvSpPr>
             <a:spLocks noGrp="1"/>
           </p:cNvSpPr>
@@ -6731,7 +6731,7 @@
       </p:sp>
       <p:sp>
         <p:nvSpPr>
-          <p:cNvPr id="204" name="PlaceHolder 3"/>
+          <p:cNvPr id="206" name="PlaceHolder 3"/>
           <p:cNvSpPr>
             <a:spLocks noGrp="1"/>
           </p:cNvSpPr>
@@ -6765,7 +6765,7 @@
       </p:sp>
       <p:sp>
         <p:nvSpPr>
-          <p:cNvPr id="205" name="PlaceHolder 4"/>
+          <p:cNvPr id="207" name="PlaceHolder 4"/>
           <p:cNvSpPr>
             <a:spLocks noGrp="1"/>
           </p:cNvSpPr>
@@ -6799,7 +6799,7 @@
       </p:sp>
       <p:sp>
         <p:nvSpPr>
-          <p:cNvPr id="206" name="PlaceHolder 5"/>
+          <p:cNvPr id="208" name="PlaceHolder 5"/>
           <p:cNvSpPr>
             <a:spLocks noGrp="1"/>
           </p:cNvSpPr>
@@ -6855,7 +6855,7 @@
       </p:grpSpPr>
       <p:sp>
         <p:nvSpPr>
-          <p:cNvPr id="16" name="PlaceHolder 1"/>
+          <p:cNvPr id="17" name="PlaceHolder 1"/>
           <p:cNvSpPr>
             <a:spLocks noGrp="1"/>
           </p:cNvSpPr>
@@ -6914,7 +6914,7 @@
       </p:grpSpPr>
       <p:sp>
         <p:nvSpPr>
-          <p:cNvPr id="207" name="PlaceHolder 1"/>
+          <p:cNvPr id="209" name="PlaceHolder 1"/>
           <p:cNvSpPr>
             <a:spLocks noGrp="1"/>
           </p:cNvSpPr>
@@ -6951,7 +6951,7 @@
       </p:sp>
       <p:sp>
         <p:nvSpPr>
-          <p:cNvPr id="208" name="PlaceHolder 2"/>
+          <p:cNvPr id="210" name="PlaceHolder 2"/>
           <p:cNvSpPr>
             <a:spLocks noGrp="1"/>
           </p:cNvSpPr>
@@ -6985,7 +6985,7 @@
       </p:sp>
       <p:sp>
         <p:nvSpPr>
-          <p:cNvPr id="209" name="PlaceHolder 3"/>
+          <p:cNvPr id="211" name="PlaceHolder 3"/>
           <p:cNvSpPr>
             <a:spLocks noGrp="1"/>
           </p:cNvSpPr>
@@ -7019,7 +7019,7 @@
       </p:sp>
       <p:sp>
         <p:nvSpPr>
-          <p:cNvPr id="210" name="PlaceHolder 4"/>
+          <p:cNvPr id="212" name="PlaceHolder 4"/>
           <p:cNvSpPr>
             <a:spLocks noGrp="1"/>
           </p:cNvSpPr>
@@ -7053,7 +7053,7 @@
       </p:sp>
       <p:sp>
         <p:nvSpPr>
-          <p:cNvPr id="211" name="PlaceHolder 5"/>
+          <p:cNvPr id="213" name="PlaceHolder 5"/>
           <p:cNvSpPr>
             <a:spLocks noGrp="1"/>
           </p:cNvSpPr>
@@ -7087,7 +7087,7 @@
       </p:sp>
       <p:sp>
         <p:nvSpPr>
-          <p:cNvPr id="212" name="PlaceHolder 6"/>
+          <p:cNvPr id="214" name="PlaceHolder 6"/>
           <p:cNvSpPr>
             <a:spLocks noGrp="1"/>
           </p:cNvSpPr>
@@ -7121,7 +7121,7 @@
       </p:sp>
       <p:sp>
         <p:nvSpPr>
-          <p:cNvPr id="213" name="PlaceHolder 7"/>
+          <p:cNvPr id="215" name="PlaceHolder 7"/>
           <p:cNvSpPr>
             <a:spLocks noGrp="1"/>
           </p:cNvSpPr>
@@ -7177,7 +7177,7 @@
       </p:grpSpPr>
       <p:sp>
         <p:nvSpPr>
-          <p:cNvPr id="17" name="PlaceHolder 1"/>
+          <p:cNvPr id="18" name="PlaceHolder 1"/>
           <p:cNvSpPr>
             <a:spLocks noGrp="1"/>
           </p:cNvSpPr>
@@ -7214,7 +7214,7 @@
       </p:sp>
       <p:sp>
         <p:nvSpPr>
-          <p:cNvPr id="18" name="PlaceHolder 2"/>
+          <p:cNvPr id="19" name="PlaceHolder 2"/>
           <p:cNvSpPr>
             <a:spLocks noGrp="1"/>
           </p:cNvSpPr>
@@ -7248,7 +7248,7 @@
       </p:sp>
       <p:sp>
         <p:nvSpPr>
-          <p:cNvPr id="19" name="PlaceHolder 3"/>
+          <p:cNvPr id="20" name="PlaceHolder 3"/>
           <p:cNvSpPr>
             <a:spLocks noGrp="1"/>
           </p:cNvSpPr>
@@ -7282,7 +7282,7 @@
       </p:sp>
       <p:sp>
         <p:nvSpPr>
-          <p:cNvPr id="20" name="PlaceHolder 4"/>
+          <p:cNvPr id="21" name="PlaceHolder 4"/>
           <p:cNvSpPr>
             <a:spLocks noGrp="1"/>
           </p:cNvSpPr>
@@ -7338,7 +7338,7 @@
       </p:grpSpPr>
       <p:sp>
         <p:nvSpPr>
-          <p:cNvPr id="21" name="PlaceHolder 1"/>
+          <p:cNvPr id="22" name="PlaceHolder 1"/>
           <p:cNvSpPr>
             <a:spLocks noGrp="1"/>
           </p:cNvSpPr>
@@ -7375,7 +7375,7 @@
       </p:sp>
       <p:sp>
         <p:nvSpPr>
-          <p:cNvPr id="22" name="PlaceHolder 2"/>
+          <p:cNvPr id="23" name="PlaceHolder 2"/>
           <p:cNvSpPr>
             <a:spLocks noGrp="1"/>
           </p:cNvSpPr>
@@ -7409,7 +7409,7 @@
       </p:sp>
       <p:sp>
         <p:nvSpPr>
-          <p:cNvPr id="23" name="PlaceHolder 3"/>
+          <p:cNvPr id="24" name="PlaceHolder 3"/>
           <p:cNvSpPr>
             <a:spLocks noGrp="1"/>
           </p:cNvSpPr>
@@ -7443,7 +7443,7 @@
       </p:sp>
       <p:sp>
         <p:nvSpPr>
-          <p:cNvPr id="24" name="PlaceHolder 4"/>
+          <p:cNvPr id="25" name="PlaceHolder 4"/>
           <p:cNvSpPr>
             <a:spLocks noGrp="1"/>
           </p:cNvSpPr>
@@ -7499,7 +7499,7 @@
       </p:grpSpPr>
       <p:sp>
         <p:nvSpPr>
-          <p:cNvPr id="25" name="PlaceHolder 1"/>
+          <p:cNvPr id="26" name="PlaceHolder 1"/>
           <p:cNvSpPr>
             <a:spLocks noGrp="1"/>
           </p:cNvSpPr>
@@ -7536,7 +7536,7 @@
       </p:sp>
       <p:sp>
         <p:nvSpPr>
-          <p:cNvPr id="26" name="PlaceHolder 2"/>
+          <p:cNvPr id="27" name="PlaceHolder 2"/>
           <p:cNvSpPr>
             <a:spLocks noGrp="1"/>
           </p:cNvSpPr>
@@ -7570,7 +7570,7 @@
       </p:sp>
       <p:sp>
         <p:nvSpPr>
-          <p:cNvPr id="27" name="PlaceHolder 3"/>
+          <p:cNvPr id="28" name="PlaceHolder 3"/>
           <p:cNvSpPr>
             <a:spLocks noGrp="1"/>
           </p:cNvSpPr>
@@ -7604,7 +7604,7 @@
       </p:sp>
       <p:sp>
         <p:nvSpPr>
-          <p:cNvPr id="28" name="PlaceHolder 4"/>
+          <p:cNvPr id="29" name="PlaceHolder 4"/>
           <p:cNvSpPr>
             <a:spLocks noGrp="1"/>
           </p:cNvSpPr>
@@ -7666,9 +7666,57 @@
           <a:chExt cx="0" cy="0"/>
         </a:xfrm>
       </p:grpSpPr>
+      <p:sp>
+        <p:nvSpPr>
+          <p:cNvPr id="0" name=""/>
+          <p:cNvSpPr/>
+          <p:nvPr/>
+        </p:nvSpPr>
+        <p:spPr>
+          <a:xfrm>
+            <a:off x="9900000" y="4860000"/>
+            <a:ext cx="1799640" cy="606960"/>
+          </a:xfrm>
+          <a:prstGeom prst="rect">
+            <a:avLst/>
+          </a:prstGeom>
+          <a:noFill/>
+          <a:ln w="0">
+            <a:noFill/>
+          </a:ln>
+        </p:spPr>
+        <p:style>
+          <a:lnRef idx="0"/>
+          <a:fillRef idx="0"/>
+          <a:effectRef idx="0"/>
+          <a:fontRef idx="minor"/>
+        </p:style>
+        <p:txBody>
+          <a:bodyPr lIns="90000" rIns="90000" tIns="45000" bIns="45000" anchor="t">
+            <a:noAutofit/>
+          </a:bodyPr>
+          <a:p>
+            <a:pPr>
+              <a:lnSpc>
+                <a:spcPct val="100000"/>
+              </a:lnSpc>
+              <a:buNone/>
+            </a:pPr>
+            <a:fld id="{D3A27B2C-0F4D-4815-9352-2DD7D5C7498D}" type="slidecount">
+              <a:rPr b="0" lang="es-AR" sz="2400" spc="-1" strike="noStrike">
+                <a:latin typeface="Times New Roman"/>
+              </a:rPr>
+              <a:t>6</a:t>
+            </a:fld>
+            <a:endParaRPr b="0" lang="es-AR" sz="2400" spc="-1" strike="noStrike">
+              <a:latin typeface="Arial"/>
+            </a:endParaRPr>
+          </a:p>
+        </p:txBody>
+      </p:sp>
       <p:pic>
         <p:nvPicPr>
-          <p:cNvPr id="0" name="Imagen 6" descr=""/>
+          <p:cNvPr id="1" name="Imagen 6" descr=""/>
           <p:cNvPicPr/>
           <p:nvPr/>
         </p:nvPicPr>
@@ -7679,7 +7727,7 @@
         <p:spPr>
           <a:xfrm>
             <a:off x="11041200" y="-75960"/>
-            <a:ext cx="920880" cy="1181160"/>
+            <a:ext cx="920520" cy="1180800"/>
           </a:xfrm>
           <a:prstGeom prst="rect">
             <a:avLst/>
@@ -7691,7 +7739,7 @@
       </p:pic>
       <p:pic>
         <p:nvPicPr>
-          <p:cNvPr id="1" name="Imagen 6" descr=""/>
+          <p:cNvPr id="2" name="Imagen 6" descr=""/>
           <p:cNvPicPr/>
           <p:nvPr/>
         </p:nvPicPr>
@@ -7702,7 +7750,7 @@
         <p:spPr>
           <a:xfrm>
             <a:off x="690120" y="5774400"/>
-            <a:ext cx="2640600" cy="608760"/>
+            <a:ext cx="2640240" cy="608400"/>
           </a:xfrm>
           <a:prstGeom prst="rect">
             <a:avLst/>
@@ -7714,7 +7762,7 @@
       </p:pic>
       <p:pic>
         <p:nvPicPr>
-          <p:cNvPr id="2" name="Imagen 7" descr=""/>
+          <p:cNvPr id="3" name="Imagen 7" descr=""/>
           <p:cNvPicPr/>
           <p:nvPr/>
         </p:nvPicPr>
@@ -7725,7 +7773,7 @@
         <p:spPr>
           <a:xfrm>
             <a:off x="9820440" y="5774400"/>
-            <a:ext cx="712440" cy="564480"/>
+            <a:ext cx="712080" cy="564120"/>
           </a:xfrm>
           <a:prstGeom prst="rect">
             <a:avLst/>
@@ -7737,20 +7785,18 @@
       </p:pic>
       <p:pic>
         <p:nvPicPr>
-          <p:cNvPr id="3" name="Imagen 8" descr=""/>
+          <p:cNvPr id="4" name="Imagen 8" descr=""/>
           <p:cNvPicPr/>
           <p:nvPr/>
         </p:nvPicPr>
         <p:blipFill>
-          <a:blip r:embed="rId6">
-            <a:lum contrast="15000"/>
-          </a:blip>
+          <a:blip r:embed="rId6"/>
           <a:stretch/>
         </p:blipFill>
         <p:spPr>
           <a:xfrm>
             <a:off x="10671840" y="5774400"/>
-            <a:ext cx="586440" cy="515880"/>
+            <a:ext cx="586080" cy="515520"/>
           </a:xfrm>
           <a:prstGeom prst="rect">
             <a:avLst/>
@@ -7762,7 +7808,7 @@
       </p:pic>
       <p:pic>
         <p:nvPicPr>
-          <p:cNvPr id="4" name="Imagen 9" descr=""/>
+          <p:cNvPr id="5" name="Imagen 9" descr=""/>
           <p:cNvPicPr/>
           <p:nvPr/>
         </p:nvPicPr>
@@ -7773,7 +7819,7 @@
         <p:spPr>
           <a:xfrm>
             <a:off x="542520" y="417960"/>
-            <a:ext cx="1374120" cy="1237320"/>
+            <a:ext cx="2258640" cy="2033640"/>
           </a:xfrm>
           <a:prstGeom prst="rect">
             <a:avLst/>
@@ -7785,14 +7831,14 @@
       </p:pic>
       <p:sp>
         <p:nvSpPr>
-          <p:cNvPr id="5" name="CustomShape 1"/>
+          <p:cNvPr id="6" name="CustomShape 1"/>
           <p:cNvSpPr/>
           <p:nvPr/>
         </p:nvSpPr>
         <p:spPr>
           <a:xfrm>
             <a:off x="6264000" y="3600000"/>
-            <a:ext cx="5038920" cy="345240"/>
+            <a:ext cx="5038560" cy="344880"/>
           </a:xfrm>
           <a:prstGeom prst="rect">
             <a:avLst/>
@@ -7811,7 +7857,7 @@
       </p:sp>
       <p:sp>
         <p:nvSpPr>
-          <p:cNvPr id="6" name="PlaceHolder 1"/>
+          <p:cNvPr id="7" name="PlaceHolder 1"/>
           <p:cNvSpPr>
             <a:spLocks noGrp="1"/>
           </p:cNvSpPr>
@@ -7821,8 +7867,8 @@
         </p:nvSpPr>
         <p:spPr>
           <a:xfrm>
-            <a:off x="2520000" y="180000"/>
-            <a:ext cx="8639640" cy="1079640"/>
+            <a:off x="609480" y="273600"/>
+            <a:ext cx="10972080" cy="1144440"/>
           </a:xfrm>
           <a:prstGeom prst="rect">
             <a:avLst/>
@@ -7837,282 +7883,21 @@
             <a:noAutofit/>
           </a:bodyPr>
           <a:p>
-            <a:pPr algn="ctr">
-              <a:buNone/>
-            </a:pPr>
             <a:r>
-              <a:rPr b="0" lang="es-AR" sz="4400" spc="-1" strike="noStrike">
+              <a:rPr b="0" lang="es-AR" sz="1800" spc="-1" strike="noStrike">
                 <a:latin typeface="Arial"/>
               </a:rPr>
-              <a:t>P</a:t>
+              <a:t>Pulse para editar el formato del texto de título</a:t>
             </a:r>
-            <a:r>
-              <a:rPr b="0" lang="es-AR" sz="4400" spc="-1" strike="noStrike">
-                <a:latin typeface="Arial"/>
-              </a:rPr>
-              <a:t>u</a:t>
-            </a:r>
-            <a:r>
-              <a:rPr b="0" lang="es-AR" sz="4400" spc="-1" strike="noStrike">
-                <a:latin typeface="Arial"/>
-              </a:rPr>
-              <a:t>l</a:t>
-            </a:r>
-            <a:r>
-              <a:rPr b="0" lang="es-AR" sz="4400" spc="-1" strike="noStrike">
-                <a:latin typeface="Arial"/>
-              </a:rPr>
-              <a:t>s</a:t>
-            </a:r>
-            <a:r>
-              <a:rPr b="0" lang="es-AR" sz="4400" spc="-1" strike="noStrike">
-                <a:latin typeface="Arial"/>
-              </a:rPr>
-              <a:t>e</a:t>
-            </a:r>
-            <a:r>
-              <a:rPr b="0" lang="es-AR" sz="4400" spc="-1" strike="noStrike">
-                <a:latin typeface="Arial"/>
-              </a:rPr>
-              <a:t> </a:t>
-            </a:r>
-            <a:r>
-              <a:rPr b="0" lang="es-AR" sz="4400" spc="-1" strike="noStrike">
-                <a:latin typeface="Arial"/>
-              </a:rPr>
-              <a:t>p</a:t>
-            </a:r>
-            <a:r>
-              <a:rPr b="0" lang="es-AR" sz="4400" spc="-1" strike="noStrike">
-                <a:latin typeface="Arial"/>
-              </a:rPr>
-              <a:t>a</a:t>
-            </a:r>
-            <a:r>
-              <a:rPr b="0" lang="es-AR" sz="4400" spc="-1" strike="noStrike">
-                <a:latin typeface="Arial"/>
-              </a:rPr>
-              <a:t>r</a:t>
-            </a:r>
-            <a:r>
-              <a:rPr b="0" lang="es-AR" sz="4400" spc="-1" strike="noStrike">
-                <a:latin typeface="Arial"/>
-              </a:rPr>
-              <a:t>a</a:t>
-            </a:r>
-            <a:r>
-              <a:rPr b="0" lang="es-AR" sz="4400" spc="-1" strike="noStrike">
-                <a:latin typeface="Arial"/>
-              </a:rPr>
-              <a:t> </a:t>
-            </a:r>
-            <a:r>
-              <a:rPr b="0" lang="es-AR" sz="4400" spc="-1" strike="noStrike">
-                <a:latin typeface="Arial"/>
-              </a:rPr>
-              <a:t>e</a:t>
-            </a:r>
-            <a:r>
-              <a:rPr b="0" lang="es-AR" sz="4400" spc="-1" strike="noStrike">
-                <a:latin typeface="Arial"/>
-              </a:rPr>
-              <a:t>d</a:t>
-            </a:r>
-            <a:r>
-              <a:rPr b="0" lang="es-AR" sz="4400" spc="-1" strike="noStrike">
-                <a:latin typeface="Arial"/>
-              </a:rPr>
-              <a:t>it</a:t>
-            </a:r>
-            <a:r>
-              <a:rPr b="0" lang="es-AR" sz="4400" spc="-1" strike="noStrike">
-                <a:latin typeface="Arial"/>
-              </a:rPr>
-              <a:t>a</a:t>
-            </a:r>
-            <a:r>
-              <a:rPr b="0" lang="es-AR" sz="4400" spc="-1" strike="noStrike">
-                <a:latin typeface="Arial"/>
-              </a:rPr>
-              <a:t>r </a:t>
-            </a:r>
-            <a:r>
-              <a:rPr b="0" lang="es-AR" sz="4400" spc="-1" strike="noStrike">
-                <a:latin typeface="Arial"/>
-              </a:rPr>
-              <a:t>e</a:t>
-            </a:r>
-            <a:r>
-              <a:rPr b="0" lang="es-AR" sz="4400" spc="-1" strike="noStrike">
-                <a:latin typeface="Arial"/>
-              </a:rPr>
-              <a:t>l </a:t>
-            </a:r>
-            <a:r>
-              <a:rPr b="0" lang="es-AR" sz="4400" spc="-1" strike="noStrike">
-                <a:latin typeface="Arial"/>
-              </a:rPr>
-              <a:t>f</a:t>
-            </a:r>
-            <a:r>
-              <a:rPr b="0" lang="es-AR" sz="4400" spc="-1" strike="noStrike">
-                <a:latin typeface="Arial"/>
-              </a:rPr>
-              <a:t>o</a:t>
-            </a:r>
-            <a:r>
-              <a:rPr b="0" lang="es-AR" sz="4400" spc="-1" strike="noStrike">
-                <a:latin typeface="Arial"/>
-              </a:rPr>
-              <a:t>r</a:t>
-            </a:r>
-            <a:r>
-              <a:rPr b="0" lang="es-AR" sz="4400" spc="-1" strike="noStrike">
-                <a:latin typeface="Arial"/>
-              </a:rPr>
-              <a:t>m</a:t>
-            </a:r>
-            <a:r>
-              <a:rPr b="0" lang="es-AR" sz="4400" spc="-1" strike="noStrike">
-                <a:latin typeface="Arial"/>
-              </a:rPr>
-              <a:t>a</a:t>
-            </a:r>
-            <a:r>
-              <a:rPr b="0" lang="es-AR" sz="4400" spc="-1" strike="noStrike">
-                <a:latin typeface="Arial"/>
-              </a:rPr>
-              <a:t>t</a:t>
-            </a:r>
-            <a:r>
-              <a:rPr b="0" lang="es-AR" sz="4400" spc="-1" strike="noStrike">
-                <a:latin typeface="Arial"/>
-              </a:rPr>
-              <a:t>o</a:t>
-            </a:r>
-            <a:r>
-              <a:rPr b="0" lang="es-AR" sz="4400" spc="-1" strike="noStrike">
-                <a:latin typeface="Arial"/>
-              </a:rPr>
-              <a:t> </a:t>
-            </a:r>
-            <a:r>
-              <a:rPr b="0" lang="es-AR" sz="4400" spc="-1" strike="noStrike">
-                <a:latin typeface="Arial"/>
-              </a:rPr>
-              <a:t>d</a:t>
-            </a:r>
-            <a:r>
-              <a:rPr b="0" lang="es-AR" sz="4400" spc="-1" strike="noStrike">
-                <a:latin typeface="Arial"/>
-              </a:rPr>
-              <a:t>e</a:t>
-            </a:r>
-            <a:r>
-              <a:rPr b="0" lang="es-AR" sz="4400" spc="-1" strike="noStrike">
-                <a:latin typeface="Arial"/>
-              </a:rPr>
-              <a:t>l </a:t>
-            </a:r>
-            <a:r>
-              <a:rPr b="0" lang="es-AR" sz="4400" spc="-1" strike="noStrike">
-                <a:latin typeface="Arial"/>
-              </a:rPr>
-              <a:t>t</a:t>
-            </a:r>
-            <a:r>
-              <a:rPr b="0" lang="es-AR" sz="4400" spc="-1" strike="noStrike">
-                <a:latin typeface="Arial"/>
-              </a:rPr>
-              <a:t>e</a:t>
-            </a:r>
-            <a:r>
-              <a:rPr b="0" lang="es-AR" sz="4400" spc="-1" strike="noStrike">
-                <a:latin typeface="Arial"/>
-              </a:rPr>
-              <a:t>x</a:t>
-            </a:r>
-            <a:r>
-              <a:rPr b="0" lang="es-AR" sz="4400" spc="-1" strike="noStrike">
-                <a:latin typeface="Arial"/>
-              </a:rPr>
-              <a:t>t</a:t>
-            </a:r>
-            <a:r>
-              <a:rPr b="0" lang="es-AR" sz="4400" spc="-1" strike="noStrike">
-                <a:latin typeface="Arial"/>
-              </a:rPr>
-              <a:t>o</a:t>
-            </a:r>
-            <a:r>
-              <a:rPr b="0" lang="es-AR" sz="4400" spc="-1" strike="noStrike">
-                <a:latin typeface="Arial"/>
-              </a:rPr>
-              <a:t> </a:t>
-            </a:r>
-            <a:r>
-              <a:rPr b="0" lang="es-AR" sz="4400" spc="-1" strike="noStrike">
-                <a:latin typeface="Arial"/>
-              </a:rPr>
-              <a:t>d</a:t>
-            </a:r>
-            <a:r>
-              <a:rPr b="0" lang="es-AR" sz="4400" spc="-1" strike="noStrike">
-                <a:latin typeface="Arial"/>
-              </a:rPr>
-              <a:t>e</a:t>
-            </a:r>
-            <a:r>
-              <a:rPr b="0" lang="es-AR" sz="4400" spc="-1" strike="noStrike">
-                <a:latin typeface="Arial"/>
-              </a:rPr>
-              <a:t> </a:t>
-            </a:r>
-            <a:r>
-              <a:rPr b="0" lang="es-AR" sz="4400" spc="-1" strike="noStrike">
-                <a:latin typeface="Arial"/>
-              </a:rPr>
-              <a:t>t</a:t>
-            </a:r>
-            <a:r>
-              <a:rPr b="0" lang="es-AR" sz="4400" spc="-1" strike="noStrike">
-                <a:latin typeface="Arial"/>
-              </a:rPr>
-              <a:t>í</a:t>
-            </a:r>
-            <a:r>
-              <a:rPr b="0" lang="es-AR" sz="4400" spc="-1" strike="noStrike">
-                <a:latin typeface="Arial"/>
-              </a:rPr>
-              <a:t>t</a:t>
-            </a:r>
-            <a:r>
-              <a:rPr b="0" lang="es-AR" sz="4400" spc="-1" strike="noStrike">
-                <a:latin typeface="Arial"/>
-              </a:rPr>
-              <a:t>u</a:t>
-            </a:r>
-            <a:r>
-              <a:rPr b="0" lang="es-AR" sz="4400" spc="-1" strike="noStrike">
-                <a:latin typeface="Arial"/>
-              </a:rPr>
-              <a:t>l</a:t>
-            </a:r>
-            <a:r>
-              <a:rPr b="0" lang="es-AR" sz="4400" spc="-1" strike="noStrike">
-                <a:latin typeface="Arial"/>
-              </a:rPr>
-              <a:t>o</a:t>
-            </a:r>
-            <a:endParaRPr b="0" lang="es-AR" sz="4400" spc="-1" strike="noStrike">
-              <a:latin typeface="Arial"/>
-            </a:endParaRPr>
-          </a:p>
-        </p:txBody>
-      </p:sp>
-      <p:sp>
-        <p:nvSpPr>
-          <p:cNvPr id="7" name="PlaceHolder 2"/>
+            <a:endParaRPr b="0" lang="es-AR" sz="1800" spc="-1" strike="noStrike">
+              <a:latin typeface="Arial"/>
+            </a:endParaRPr>
+          </a:p>
+        </p:txBody>
+      </p:sp>
+      <p:sp>
+        <p:nvSpPr>
+          <p:cNvPr id="8" name="PlaceHolder 2"/>
           <p:cNvSpPr>
             <a:spLocks noGrp="1"/>
           </p:cNvSpPr>
@@ -8123,7 +7908,7 @@
         <p:spPr>
           <a:xfrm>
             <a:off x="609480" y="1604520"/>
-            <a:ext cx="10972440" cy="3977280"/>
+            <a:ext cx="10972080" cy="3976920"/>
           </a:xfrm>
           <a:prstGeom prst="rect">
             <a:avLst/>
@@ -8150,12 +7935,12 @@
               <a:buChar char=""/>
             </a:pPr>
             <a:r>
-              <a:rPr b="0" lang="es-AR" sz="3200" spc="-1" strike="noStrike">
+              <a:rPr b="0" lang="es-AR" sz="1800" spc="-1" strike="noStrike">
                 <a:latin typeface="Arial"/>
               </a:rPr>
               <a:t>Pulse para editar el formato de texto del esquema</a:t>
             </a:r>
-            <a:endParaRPr b="0" lang="es-AR" sz="3200" spc="-1" strike="noStrike">
+            <a:endParaRPr b="0" lang="es-AR" sz="1800" spc="-1" strike="noStrike">
               <a:latin typeface="Arial"/>
             </a:endParaRPr>
           </a:p>
@@ -8172,12 +7957,12 @@
               <a:buChar char=""/>
             </a:pPr>
             <a:r>
-              <a:rPr b="0" lang="es-AR" sz="2800" spc="-1" strike="noStrike">
+              <a:rPr b="0" lang="es-AR" sz="1800" spc="-1" strike="noStrike">
                 <a:latin typeface="Arial"/>
               </a:rPr>
               <a:t>Segundo nivel del esquema</a:t>
             </a:r>
-            <a:endParaRPr b="0" lang="es-AR" sz="2800" spc="-1" strike="noStrike">
+            <a:endParaRPr b="0" lang="es-AR" sz="1800" spc="-1" strike="noStrike">
               <a:latin typeface="Arial"/>
             </a:endParaRPr>
           </a:p>
@@ -8194,12 +7979,12 @@
               <a:buChar char=""/>
             </a:pPr>
             <a:r>
-              <a:rPr b="0" lang="es-AR" sz="2400" spc="-1" strike="noStrike">
+              <a:rPr b="0" lang="es-AR" sz="1800" spc="-1" strike="noStrike">
                 <a:latin typeface="Arial"/>
               </a:rPr>
               <a:t>Tercer nivel del esquema</a:t>
             </a:r>
-            <a:endParaRPr b="0" lang="es-AR" sz="2400" spc="-1" strike="noStrike">
+            <a:endParaRPr b="0" lang="es-AR" sz="1800" spc="-1" strike="noStrike">
               <a:latin typeface="Arial"/>
             </a:endParaRPr>
           </a:p>
@@ -8216,12 +8001,12 @@
               <a:buChar char=""/>
             </a:pPr>
             <a:r>
-              <a:rPr b="0" lang="es-AR" sz="2000" spc="-1" strike="noStrike">
+              <a:rPr b="0" lang="es-AR" sz="1800" spc="-1" strike="noStrike">
                 <a:latin typeface="Arial"/>
               </a:rPr>
               <a:t>Cuarto nivel del esquema</a:t>
             </a:r>
-            <a:endParaRPr b="0" lang="es-AR" sz="2000" spc="-1" strike="noStrike">
+            <a:endParaRPr b="0" lang="es-AR" sz="1800" spc="-1" strike="noStrike">
               <a:latin typeface="Arial"/>
             </a:endParaRPr>
           </a:p>
@@ -8238,12 +8023,12 @@
               <a:buChar char=""/>
             </a:pPr>
             <a:r>
-              <a:rPr b="0" lang="es-AR" sz="2000" spc="-1" strike="noStrike">
+              <a:rPr b="0" lang="es-AR" sz="1800" spc="-1" strike="noStrike">
                 <a:latin typeface="Arial"/>
               </a:rPr>
               <a:t>Quinto nivel del esquema</a:t>
             </a:r>
-            <a:endParaRPr b="0" lang="es-AR" sz="2000" spc="-1" strike="noStrike">
+            <a:endParaRPr b="0" lang="es-AR" sz="1800" spc="-1" strike="noStrike">
               <a:latin typeface="Arial"/>
             </a:endParaRPr>
           </a:p>
@@ -8260,12 +8045,12 @@
               <a:buChar char=""/>
             </a:pPr>
             <a:r>
-              <a:rPr b="0" lang="es-AR" sz="2000" spc="-1" strike="noStrike">
+              <a:rPr b="0" lang="es-AR" sz="1800" spc="-1" strike="noStrike">
                 <a:latin typeface="Arial"/>
               </a:rPr>
               <a:t>Sexto nivel del esquema</a:t>
             </a:r>
-            <a:endParaRPr b="0" lang="es-AR" sz="2000" spc="-1" strike="noStrike">
+            <a:endParaRPr b="0" lang="es-AR" sz="1800" spc="-1" strike="noStrike">
               <a:latin typeface="Arial"/>
             </a:endParaRPr>
           </a:p>
@@ -8282,12 +8067,12 @@
               <a:buChar char=""/>
             </a:pPr>
             <a:r>
-              <a:rPr b="0" lang="es-AR" sz="2000" spc="-1" strike="noStrike">
+              <a:rPr b="0" lang="es-AR" sz="1800" spc="-1" strike="noStrike">
                 <a:latin typeface="Arial"/>
               </a:rPr>
               <a:t>Séptimo nivel del esquema</a:t>
             </a:r>
-            <a:endParaRPr b="0" lang="es-AR" sz="2000" spc="-1" strike="noStrike">
+            <a:endParaRPr b="0" lang="es-AR" sz="1800" spc="-1" strike="noStrike">
               <a:latin typeface="Arial"/>
             </a:endParaRPr>
           </a:p>
@@ -8340,43 +8125,55 @@
       </p:grpSpPr>
       <p:sp>
         <p:nvSpPr>
-          <p:cNvPr id="44" name=""/>
-          <p:cNvSpPr txBox="1"/>
+          <p:cNvPr id="45" name=""/>
+          <p:cNvSpPr/>
           <p:nvPr/>
         </p:nvSpPr>
         <p:spPr>
           <a:xfrm>
             <a:off x="9900000" y="4860000"/>
-            <a:ext cx="1800000" cy="607320"/>
-          </a:xfrm>
-          <a:prstGeom prst="rect">
-            <a:avLst/>
-          </a:prstGeom>
-          <a:noFill/>
-          <a:ln w="0">
-            <a:noFill/>
-          </a:ln>
-        </p:spPr>
+            <a:ext cx="1799640" cy="606960"/>
+          </a:xfrm>
+          <a:prstGeom prst="rect">
+            <a:avLst/>
+          </a:prstGeom>
+          <a:noFill/>
+          <a:ln w="0">
+            <a:noFill/>
+          </a:ln>
+        </p:spPr>
+        <p:style>
+          <a:lnRef idx="0"/>
+          <a:fillRef idx="0"/>
+          <a:effectRef idx="0"/>
+          <a:fontRef idx="minor"/>
+        </p:style>
         <p:txBody>
           <a:bodyPr lIns="90000" rIns="90000" tIns="45000" bIns="45000" anchor="t">
             <a:noAutofit/>
           </a:bodyPr>
           <a:p>
-            <a:fld id="{AEDD095F-DE76-4FCC-82C8-93C250236AD3}" type="slidecount">
+            <a:pPr>
+              <a:lnSpc>
+                <a:spcPct val="100000"/>
+              </a:lnSpc>
+              <a:buNone/>
+            </a:pPr>
+            <a:fld id="{C9E0409E-B4C1-4265-86B9-A3B1A82571EB}" type="slidecount">
               <a:rPr b="0" lang="es-AR" sz="2400" spc="-1" strike="noStrike">
                 <a:latin typeface="Times New Roman"/>
               </a:rPr>
               <a:t>6</a:t>
             </a:fld>
             <a:endParaRPr b="0" lang="es-AR" sz="2400" spc="-1" strike="noStrike">
-              <a:latin typeface="Times New Roman"/>
+              <a:latin typeface="Arial"/>
             </a:endParaRPr>
           </a:p>
         </p:txBody>
       </p:sp>
       <p:pic>
         <p:nvPicPr>
-          <p:cNvPr id="45" name="Imagen 6" descr=""/>
+          <p:cNvPr id="46" name="Imagen 6" descr=""/>
           <p:cNvPicPr/>
           <p:nvPr/>
         </p:nvPicPr>
@@ -8387,7 +8184,7 @@
         <p:spPr>
           <a:xfrm>
             <a:off x="11041200" y="-75960"/>
-            <a:ext cx="920880" cy="1181160"/>
+            <a:ext cx="920520" cy="1180800"/>
           </a:xfrm>
           <a:prstGeom prst="rect">
             <a:avLst/>
@@ -8399,7 +8196,7 @@
       </p:pic>
       <p:pic>
         <p:nvPicPr>
-          <p:cNvPr id="46" name="Imagen 6" descr=""/>
+          <p:cNvPr id="47" name="Imagen 6" descr=""/>
           <p:cNvPicPr/>
           <p:nvPr/>
         </p:nvPicPr>
@@ -8410,7 +8207,7 @@
         <p:spPr>
           <a:xfrm>
             <a:off x="690120" y="5774400"/>
-            <a:ext cx="2640600" cy="608760"/>
+            <a:ext cx="2640240" cy="608400"/>
           </a:xfrm>
           <a:prstGeom prst="rect">
             <a:avLst/>
@@ -8422,7 +8219,7 @@
       </p:pic>
       <p:pic>
         <p:nvPicPr>
-          <p:cNvPr id="47" name="Imagen 7" descr=""/>
+          <p:cNvPr id="48" name="Imagen 7" descr=""/>
           <p:cNvPicPr/>
           <p:nvPr/>
         </p:nvPicPr>
@@ -8433,7 +8230,7 @@
         <p:spPr>
           <a:xfrm>
             <a:off x="9820440" y="5774400"/>
-            <a:ext cx="712440" cy="564480"/>
+            <a:ext cx="712080" cy="564120"/>
           </a:xfrm>
           <a:prstGeom prst="rect">
             <a:avLst/>
@@ -8445,7 +8242,7 @@
       </p:pic>
       <p:pic>
         <p:nvPicPr>
-          <p:cNvPr id="48" name="Imagen 8" descr=""/>
+          <p:cNvPr id="49" name="Imagen 8" descr=""/>
           <p:cNvPicPr/>
           <p:nvPr/>
         </p:nvPicPr>
@@ -8456,7 +8253,7 @@
         <p:spPr>
           <a:xfrm>
             <a:off x="10671840" y="5774400"/>
-            <a:ext cx="586440" cy="515880"/>
+            <a:ext cx="586080" cy="515520"/>
           </a:xfrm>
           <a:prstGeom prst="rect">
             <a:avLst/>
@@ -8468,7 +8265,7 @@
       </p:pic>
       <p:pic>
         <p:nvPicPr>
-          <p:cNvPr id="49" name="Imagen 9" descr=""/>
+          <p:cNvPr id="50" name="Imagen 9" descr=""/>
           <p:cNvPicPr/>
           <p:nvPr/>
         </p:nvPicPr>
@@ -8479,7 +8276,7 @@
         <p:spPr>
           <a:xfrm>
             <a:off x="542520" y="417960"/>
-            <a:ext cx="2259000" cy="2034000"/>
+            <a:ext cx="2258640" cy="2033640"/>
           </a:xfrm>
           <a:prstGeom prst="rect">
             <a:avLst/>
@@ -8491,14 +8288,14 @@
       </p:pic>
       <p:sp>
         <p:nvSpPr>
-          <p:cNvPr id="50" name="CustomShape 1"/>
+          <p:cNvPr id="51" name="CustomShape 1"/>
           <p:cNvSpPr/>
           <p:nvPr/>
         </p:nvSpPr>
         <p:spPr>
           <a:xfrm>
             <a:off x="6264000" y="3600000"/>
-            <a:ext cx="5038920" cy="345240"/>
+            <a:ext cx="5038560" cy="344880"/>
           </a:xfrm>
           <a:prstGeom prst="rect">
             <a:avLst/>
@@ -8517,7 +8314,7 @@
       </p:sp>
       <p:sp>
         <p:nvSpPr>
-          <p:cNvPr id="51" name="PlaceHolder 1"/>
+          <p:cNvPr id="52" name="PlaceHolder 1"/>
           <p:cNvSpPr>
             <a:spLocks noGrp="1"/>
           </p:cNvSpPr>
@@ -8560,7 +8357,7 @@
       </p:sp>
       <p:sp>
         <p:nvSpPr>
-          <p:cNvPr id="52" name="PlaceHolder 2"/>
+          <p:cNvPr id="53" name="PlaceHolder 2"/>
           <p:cNvSpPr>
             <a:spLocks noGrp="1"/>
           </p:cNvSpPr>
@@ -8601,19 +8398,7 @@
               <a:rPr b="0" lang="es-AR" sz="3200" spc="-1" strike="noStrike">
                 <a:latin typeface="Arial"/>
               </a:rPr>
-              <a:t>Pulse para editar el </a:t>
-            </a:r>
-            <a:r>
-              <a:rPr b="0" lang="es-AR" sz="3200" spc="-1" strike="noStrike">
-                <a:latin typeface="Arial"/>
-              </a:rPr>
-              <a:t>formato de texto del </a:t>
-            </a:r>
-            <a:r>
-              <a:rPr b="0" lang="es-AR" sz="3200" spc="-1" strike="noStrike">
-                <a:latin typeface="Arial"/>
-              </a:rPr>
-              <a:t>esquema</a:t>
+              <a:t>Pulse para editar el formato de texto del esquema</a:t>
             </a:r>
             <a:endParaRPr b="0" lang="es-AR" sz="3200" spc="-1" strike="noStrike">
               <a:latin typeface="Arial"/>
@@ -8723,13 +8508,7 @@
               <a:rPr b="0" lang="es-AR" sz="2000" spc="-1" strike="noStrike">
                 <a:latin typeface="Arial"/>
               </a:rPr>
-              <a:t>Sexto nivel del </a:t>
-            </a:r>
-            <a:r>
-              <a:rPr b="0" lang="es-AR" sz="2000" spc="-1" strike="noStrike">
-                <a:latin typeface="Arial"/>
-              </a:rPr>
-              <a:t>esquema</a:t>
+              <a:t>Sexto nivel del esquema</a:t>
             </a:r>
             <a:endParaRPr b="0" lang="es-AR" sz="2000" spc="-1" strike="noStrike">
               <a:latin typeface="Arial"/>
@@ -8751,13 +8530,7 @@
               <a:rPr b="0" lang="es-AR" sz="2000" spc="-1" strike="noStrike">
                 <a:latin typeface="Arial"/>
               </a:rPr>
-              <a:t>Séptimo nivel del </a:t>
-            </a:r>
-            <a:r>
-              <a:rPr b="0" lang="es-AR" sz="2000" spc="-1" strike="noStrike">
-                <a:latin typeface="Arial"/>
-              </a:rPr>
-              <a:t>esquema</a:t>
+              <a:t>Séptimo nivel del esquema</a:t>
             </a:r>
             <a:endParaRPr b="0" lang="es-AR" sz="2000" spc="-1" strike="noStrike">
               <a:latin typeface="Arial"/>
@@ -8812,7 +8585,7 @@
       </p:grpSpPr>
       <p:pic>
         <p:nvPicPr>
-          <p:cNvPr id="89" name="Imagen 6" descr=""/>
+          <p:cNvPr id="90" name="Imagen 6" descr=""/>
           <p:cNvPicPr/>
           <p:nvPr/>
         </p:nvPicPr>
@@ -8823,7 +8596,7 @@
         <p:spPr>
           <a:xfrm>
             <a:off x="11041200" y="-75960"/>
-            <a:ext cx="920880" cy="1181160"/>
+            <a:ext cx="920520" cy="1180800"/>
           </a:xfrm>
           <a:prstGeom prst="rect">
             <a:avLst/>
@@ -8835,7 +8608,7 @@
       </p:pic>
       <p:pic>
         <p:nvPicPr>
-          <p:cNvPr id="90" name="Imagen 10" descr=""/>
+          <p:cNvPr id="91" name="Imagen 10" descr=""/>
           <p:cNvPicPr/>
           <p:nvPr/>
         </p:nvPicPr>
@@ -8846,7 +8619,7 @@
         <p:spPr>
           <a:xfrm>
             <a:off x="554040" y="5866200"/>
-            <a:ext cx="2640600" cy="608760"/>
+            <a:ext cx="2640240" cy="608400"/>
           </a:xfrm>
           <a:prstGeom prst="rect">
             <a:avLst/>
@@ -8858,7 +8631,7 @@
       </p:pic>
       <p:pic>
         <p:nvPicPr>
-          <p:cNvPr id="91" name="Imagen 11" descr=""/>
+          <p:cNvPr id="92" name="Imagen 11" descr=""/>
           <p:cNvPicPr/>
           <p:nvPr/>
         </p:nvPicPr>
@@ -8869,7 +8642,7 @@
         <p:spPr>
           <a:xfrm>
             <a:off x="502560" y="489600"/>
-            <a:ext cx="2259000" cy="2034000"/>
+            <a:ext cx="2258640" cy="2033640"/>
           </a:xfrm>
           <a:prstGeom prst="rect">
             <a:avLst/>
@@ -8881,7 +8654,7 @@
       </p:pic>
       <p:sp>
         <p:nvSpPr>
-          <p:cNvPr id="92" name="PlaceHolder 1"/>
+          <p:cNvPr id="93" name="PlaceHolder 1"/>
           <p:cNvSpPr>
             <a:spLocks noGrp="1"/>
           </p:cNvSpPr>
@@ -8892,7 +8665,7 @@
         <p:spPr>
           <a:xfrm>
             <a:off x="609480" y="273600"/>
-            <a:ext cx="10972440" cy="1144800"/>
+            <a:ext cx="10972080" cy="1144440"/>
           </a:xfrm>
           <a:prstGeom prst="rect">
             <a:avLst/>
@@ -8907,24 +8680,21 @@
             <a:noAutofit/>
           </a:bodyPr>
           <a:p>
-            <a:pPr algn="ctr">
-              <a:buNone/>
-            </a:pPr>
             <a:r>
-              <a:rPr b="0" lang="es-AR" sz="4400" spc="-1" strike="noStrike">
+              <a:rPr b="0" lang="es-AR" sz="1800" spc="-1" strike="noStrike">
                 <a:latin typeface="Arial"/>
               </a:rPr>
               <a:t>Pulse para editar el formato del texto de título</a:t>
             </a:r>
-            <a:endParaRPr b="0" lang="es-AR" sz="4400" spc="-1" strike="noStrike">
-              <a:latin typeface="Arial"/>
-            </a:endParaRPr>
-          </a:p>
-        </p:txBody>
-      </p:sp>
-      <p:sp>
-        <p:nvSpPr>
-          <p:cNvPr id="93" name="PlaceHolder 2"/>
+            <a:endParaRPr b="0" lang="es-AR" sz="1800" spc="-1" strike="noStrike">
+              <a:latin typeface="Arial"/>
+            </a:endParaRPr>
+          </a:p>
+        </p:txBody>
+      </p:sp>
+      <p:sp>
+        <p:nvSpPr>
+          <p:cNvPr id="94" name="PlaceHolder 2"/>
           <p:cNvSpPr>
             <a:spLocks noGrp="1"/>
           </p:cNvSpPr>
@@ -8935,7 +8705,7 @@
         <p:spPr>
           <a:xfrm>
             <a:off x="609480" y="1604520"/>
-            <a:ext cx="10972440" cy="3977280"/>
+            <a:ext cx="5353920" cy="3976920"/>
           </a:xfrm>
           <a:prstGeom prst="rect">
             <a:avLst/>
@@ -8962,12 +8732,12 @@
               <a:buChar char=""/>
             </a:pPr>
             <a:r>
-              <a:rPr b="0" lang="es-AR" sz="3200" spc="-1" strike="noStrike">
+              <a:rPr b="0" lang="es-AR" sz="1800" spc="-1" strike="noStrike">
                 <a:latin typeface="Arial"/>
               </a:rPr>
               <a:t>Pulse para editar el formato de texto del esquema</a:t>
             </a:r>
-            <a:endParaRPr b="0" lang="es-AR" sz="3200" spc="-1" strike="noStrike">
+            <a:endParaRPr b="0" lang="es-AR" sz="1800" spc="-1" strike="noStrike">
               <a:latin typeface="Arial"/>
             </a:endParaRPr>
           </a:p>
@@ -8984,12 +8754,12 @@
               <a:buChar char=""/>
             </a:pPr>
             <a:r>
-              <a:rPr b="0" lang="es-AR" sz="2800" spc="-1" strike="noStrike">
+              <a:rPr b="0" lang="es-AR" sz="1800" spc="-1" strike="noStrike">
                 <a:latin typeface="Arial"/>
               </a:rPr>
               <a:t>Segundo nivel del esquema</a:t>
             </a:r>
-            <a:endParaRPr b="0" lang="es-AR" sz="2800" spc="-1" strike="noStrike">
+            <a:endParaRPr b="0" lang="es-AR" sz="1800" spc="-1" strike="noStrike">
               <a:latin typeface="Arial"/>
             </a:endParaRPr>
           </a:p>
@@ -9006,12 +8776,12 @@
               <a:buChar char=""/>
             </a:pPr>
             <a:r>
-              <a:rPr b="0" lang="es-AR" sz="2400" spc="-1" strike="noStrike">
+              <a:rPr b="0" lang="es-AR" sz="1800" spc="-1" strike="noStrike">
                 <a:latin typeface="Arial"/>
               </a:rPr>
               <a:t>Tercer nivel del esquema</a:t>
             </a:r>
-            <a:endParaRPr b="0" lang="es-AR" sz="2400" spc="-1" strike="noStrike">
+            <a:endParaRPr b="0" lang="es-AR" sz="1800" spc="-1" strike="noStrike">
               <a:latin typeface="Arial"/>
             </a:endParaRPr>
           </a:p>
@@ -9028,12 +8798,12 @@
               <a:buChar char=""/>
             </a:pPr>
             <a:r>
-              <a:rPr b="0" lang="es-AR" sz="2000" spc="-1" strike="noStrike">
+              <a:rPr b="0" lang="es-AR" sz="1800" spc="-1" strike="noStrike">
                 <a:latin typeface="Arial"/>
               </a:rPr>
               <a:t>Cuarto nivel del esquema</a:t>
             </a:r>
-            <a:endParaRPr b="0" lang="es-AR" sz="2000" spc="-1" strike="noStrike">
+            <a:endParaRPr b="0" lang="es-AR" sz="1800" spc="-1" strike="noStrike">
               <a:latin typeface="Arial"/>
             </a:endParaRPr>
           </a:p>
@@ -9050,12 +8820,12 @@
               <a:buChar char=""/>
             </a:pPr>
             <a:r>
-              <a:rPr b="0" lang="es-AR" sz="2000" spc="-1" strike="noStrike">
+              <a:rPr b="0" lang="es-AR" sz="1800" spc="-1" strike="noStrike">
                 <a:latin typeface="Arial"/>
               </a:rPr>
               <a:t>Quinto nivel del esquema</a:t>
             </a:r>
-            <a:endParaRPr b="0" lang="es-AR" sz="2000" spc="-1" strike="noStrike">
+            <a:endParaRPr b="0" lang="es-AR" sz="1800" spc="-1" strike="noStrike">
               <a:latin typeface="Arial"/>
             </a:endParaRPr>
           </a:p>
@@ -9072,12 +8842,12 @@
               <a:buChar char=""/>
             </a:pPr>
             <a:r>
-              <a:rPr b="0" lang="es-AR" sz="2000" spc="-1" strike="noStrike">
+              <a:rPr b="0" lang="es-AR" sz="1800" spc="-1" strike="noStrike">
                 <a:latin typeface="Arial"/>
               </a:rPr>
               <a:t>Sexto nivel del esquema</a:t>
             </a:r>
-            <a:endParaRPr b="0" lang="es-AR" sz="2000" spc="-1" strike="noStrike">
+            <a:endParaRPr b="0" lang="es-AR" sz="1800" spc="-1" strike="noStrike">
               <a:latin typeface="Arial"/>
             </a:endParaRPr>
           </a:p>
@@ -9094,12 +8864,195 @@
               <a:buChar char=""/>
             </a:pPr>
             <a:r>
-              <a:rPr b="0" lang="es-AR" sz="2000" spc="-1" strike="noStrike">
+              <a:rPr b="0" lang="es-AR" sz="1800" spc="-1" strike="noStrike">
                 <a:latin typeface="Arial"/>
               </a:rPr>
               <a:t>Séptimo nivel del esquema</a:t>
             </a:r>
-            <a:endParaRPr b="0" lang="es-AR" sz="2000" spc="-1" strike="noStrike">
+            <a:endParaRPr b="0" lang="es-AR" sz="1800" spc="-1" strike="noStrike">
+              <a:latin typeface="Arial"/>
+            </a:endParaRPr>
+          </a:p>
+        </p:txBody>
+      </p:sp>
+      <p:sp>
+        <p:nvSpPr>
+          <p:cNvPr id="95" name="PlaceHolder 3"/>
+          <p:cNvSpPr>
+            <a:spLocks noGrp="1"/>
+          </p:cNvSpPr>
+          <p:nvPr>
+            <p:ph type="body"/>
+          </p:nvPr>
+        </p:nvSpPr>
+        <p:spPr>
+          <a:xfrm>
+            <a:off x="6231960" y="1604520"/>
+            <a:ext cx="5353920" cy="3976920"/>
+          </a:xfrm>
+          <a:prstGeom prst="rect">
+            <a:avLst/>
+          </a:prstGeom>
+          <a:noFill/>
+          <a:ln w="0">
+            <a:noFill/>
+          </a:ln>
+        </p:spPr>
+        <p:txBody>
+          <a:bodyPr lIns="0" rIns="0" tIns="0" bIns="0" anchor="t">
+            <a:normAutofit/>
+          </a:bodyPr>
+          <a:p>
+            <a:pPr marL="432000" indent="-324000">
+              <a:spcBef>
+                <a:spcPts val="1417"/>
+              </a:spcBef>
+              <a:buClr>
+                <a:srgbClr val="000000"/>
+              </a:buClr>
+              <a:buSzPct val="45000"/>
+              <a:buFont typeface="Wingdings" charset="2"/>
+              <a:buChar char=""/>
+            </a:pPr>
+            <a:r>
+              <a:rPr b="0" lang="es-AR" sz="1800" spc="-1" strike="noStrike">
+                <a:latin typeface="Arial"/>
+              </a:rPr>
+              <a:t>Pulse para editar el formato de texto del esquema</a:t>
+            </a:r>
+            <a:endParaRPr b="0" lang="es-AR" sz="1800" spc="-1" strike="noStrike">
+              <a:latin typeface="Arial"/>
+            </a:endParaRPr>
+          </a:p>
+          <a:p>
+            <a:pPr lvl="1" marL="864000" indent="-324000">
+              <a:spcBef>
+                <a:spcPts val="1134"/>
+              </a:spcBef>
+              <a:buClr>
+                <a:srgbClr val="000000"/>
+              </a:buClr>
+              <a:buSzPct val="75000"/>
+              <a:buFont typeface="Symbol" charset="2"/>
+              <a:buChar char=""/>
+            </a:pPr>
+            <a:r>
+              <a:rPr b="0" lang="es-AR" sz="1800" spc="-1" strike="noStrike">
+                <a:latin typeface="Arial"/>
+              </a:rPr>
+              <a:t>Segundo nivel del esquema</a:t>
+            </a:r>
+            <a:endParaRPr b="0" lang="es-AR" sz="1800" spc="-1" strike="noStrike">
+              <a:latin typeface="Arial"/>
+            </a:endParaRPr>
+          </a:p>
+          <a:p>
+            <a:pPr lvl="2" marL="1296000" indent="-288000">
+              <a:spcBef>
+                <a:spcPts val="850"/>
+              </a:spcBef>
+              <a:buClr>
+                <a:srgbClr val="000000"/>
+              </a:buClr>
+              <a:buSzPct val="45000"/>
+              <a:buFont typeface="Wingdings" charset="2"/>
+              <a:buChar char=""/>
+            </a:pPr>
+            <a:r>
+              <a:rPr b="0" lang="es-AR" sz="1800" spc="-1" strike="noStrike">
+                <a:latin typeface="Arial"/>
+              </a:rPr>
+              <a:t>Tercer nivel del esquema</a:t>
+            </a:r>
+            <a:endParaRPr b="0" lang="es-AR" sz="1800" spc="-1" strike="noStrike">
+              <a:latin typeface="Arial"/>
+            </a:endParaRPr>
+          </a:p>
+          <a:p>
+            <a:pPr lvl="3" marL="1728000" indent="-216000">
+              <a:spcBef>
+                <a:spcPts val="567"/>
+              </a:spcBef>
+              <a:buClr>
+                <a:srgbClr val="000000"/>
+              </a:buClr>
+              <a:buSzPct val="75000"/>
+              <a:buFont typeface="Symbol" charset="2"/>
+              <a:buChar char=""/>
+            </a:pPr>
+            <a:r>
+              <a:rPr b="0" lang="es-AR" sz="1800" spc="-1" strike="noStrike">
+                <a:latin typeface="Arial"/>
+              </a:rPr>
+              <a:t>Cuarto nivel del esquema</a:t>
+            </a:r>
+            <a:endParaRPr b="0" lang="es-AR" sz="1800" spc="-1" strike="noStrike">
+              <a:latin typeface="Arial"/>
+            </a:endParaRPr>
+          </a:p>
+          <a:p>
+            <a:pPr lvl="4" marL="2160000" indent="-216000">
+              <a:spcBef>
+                <a:spcPts val="283"/>
+              </a:spcBef>
+              <a:buClr>
+                <a:srgbClr val="000000"/>
+              </a:buClr>
+              <a:buSzPct val="45000"/>
+              <a:buFont typeface="Wingdings" charset="2"/>
+              <a:buChar char=""/>
+            </a:pPr>
+            <a:r>
+              <a:rPr b="0" lang="es-AR" sz="1800" spc="-1" strike="noStrike">
+                <a:latin typeface="Arial"/>
+              </a:rPr>
+              <a:t>Quinto nivel del esquema</a:t>
+            </a:r>
+            <a:endParaRPr b="0" lang="es-AR" sz="1800" spc="-1" strike="noStrike">
+              <a:latin typeface="Arial"/>
+            </a:endParaRPr>
+          </a:p>
+          <a:p>
+            <a:pPr lvl="5" marL="2592000" indent="-216000">
+              <a:spcBef>
+                <a:spcPts val="283"/>
+              </a:spcBef>
+              <a:buClr>
+                <a:srgbClr val="000000"/>
+              </a:buClr>
+              <a:buSzPct val="45000"/>
+              <a:buFont typeface="Wingdings" charset="2"/>
+              <a:buChar char=""/>
+            </a:pPr>
+            <a:r>
+              <a:rPr b="0" lang="es-AR" sz="1800" spc="-1" strike="noStrike">
+                <a:latin typeface="Arial"/>
+              </a:rPr>
+              <a:t>Sexto nivel del esquema</a:t>
+            </a:r>
+            <a:endParaRPr b="0" lang="es-AR" sz="1800" spc="-1" strike="noStrike">
+              <a:latin typeface="Arial"/>
+            </a:endParaRPr>
+          </a:p>
+          <a:p>
+            <a:pPr lvl="6" marL="3024000" indent="-216000">
+              <a:spcBef>
+                <a:spcPts val="283"/>
+              </a:spcBef>
+              <a:buClr>
+                <a:srgbClr val="000000"/>
+              </a:buClr>
+              <a:buSzPct val="45000"/>
+              <a:buFont typeface="Wingdings" charset="2"/>
+              <a:buChar char=""/>
+            </a:pPr>
+            <a:r>
+              <a:rPr b="0" lang="es-AR" sz="1800" spc="-1" strike="noStrike">
+                <a:latin typeface="Arial"/>
+              </a:rPr>
+              <a:t>Séptimo nivel del esquema</a:t>
+            </a:r>
+            <a:endParaRPr b="0" lang="es-AR" sz="1800" spc="-1" strike="noStrike">
               <a:latin typeface="Arial"/>
             </a:endParaRPr>
           </a:p>
@@ -9152,7 +9105,7 @@
       </p:grpSpPr>
       <p:pic>
         <p:nvPicPr>
-          <p:cNvPr id="130" name="Imagen 6" descr=""/>
+          <p:cNvPr id="132" name="Imagen 6" descr=""/>
           <p:cNvPicPr/>
           <p:nvPr/>
         </p:nvPicPr>
@@ -9163,7 +9116,7 @@
         <p:spPr>
           <a:xfrm>
             <a:off x="11041200" y="-75960"/>
-            <a:ext cx="920880" cy="1181160"/>
+            <a:ext cx="920520" cy="1180800"/>
           </a:xfrm>
           <a:prstGeom prst="rect">
             <a:avLst/>
@@ -9175,7 +9128,7 @@
       </p:pic>
       <p:pic>
         <p:nvPicPr>
-          <p:cNvPr id="131" name="Imagen 7" descr=""/>
+          <p:cNvPr id="133" name="Imagen 7" descr=""/>
           <p:cNvPicPr/>
           <p:nvPr/>
         </p:nvPicPr>
@@ -9186,7 +9139,7 @@
         <p:spPr>
           <a:xfrm>
             <a:off x="10177920" y="6323040"/>
-            <a:ext cx="1618200" cy="372600"/>
+            <a:ext cx="1617840" cy="372240"/>
           </a:xfrm>
           <a:prstGeom prst="rect">
             <a:avLst/>
@@ -9198,7 +9151,7 @@
       </p:pic>
       <p:pic>
         <p:nvPicPr>
-          <p:cNvPr id="132" name="Imagen 8" descr=""/>
+          <p:cNvPr id="134" name="Imagen 8" descr=""/>
           <p:cNvPicPr/>
           <p:nvPr/>
         </p:nvPicPr>
@@ -9209,7 +9162,7 @@
         <p:spPr>
           <a:xfrm>
             <a:off x="502560" y="6323400"/>
-            <a:ext cx="1904040" cy="440640"/>
+            <a:ext cx="1903680" cy="440280"/>
           </a:xfrm>
           <a:prstGeom prst="rect">
             <a:avLst/>
@@ -9221,7 +9174,7 @@
       </p:pic>
       <p:sp>
         <p:nvSpPr>
-          <p:cNvPr id="133" name="Line 1"/>
+          <p:cNvPr id="135" name="Line 1"/>
           <p:cNvSpPr/>
           <p:nvPr/>
         </p:nvSpPr>
@@ -9255,7 +9208,7 @@
       </p:sp>
       <p:sp>
         <p:nvSpPr>
-          <p:cNvPr id="134" name="PlaceHolder 1"/>
+          <p:cNvPr id="136" name="PlaceHolder 1"/>
           <p:cNvSpPr>
             <a:spLocks noGrp="1"/>
           </p:cNvSpPr>
@@ -9298,7 +9251,7 @@
       </p:sp>
       <p:sp>
         <p:nvSpPr>
-          <p:cNvPr id="135" name="PlaceHolder 2"/>
+          <p:cNvPr id="137" name="PlaceHolder 2"/>
           <p:cNvSpPr>
             <a:spLocks noGrp="1"/>
           </p:cNvSpPr>
@@ -9526,7 +9479,7 @@
       </p:grpSpPr>
       <p:pic>
         <p:nvPicPr>
-          <p:cNvPr id="172" name="Imagen 6" descr=""/>
+          <p:cNvPr id="174" name="Imagen 6" descr=""/>
           <p:cNvPicPr/>
           <p:nvPr/>
         </p:nvPicPr>
@@ -9537,7 +9490,7 @@
         <p:spPr>
           <a:xfrm>
             <a:off x="11041200" y="-75960"/>
-            <a:ext cx="920880" cy="1181160"/>
+            <a:ext cx="920520" cy="1180800"/>
           </a:xfrm>
           <a:prstGeom prst="rect">
             <a:avLst/>
@@ -9549,7 +9502,7 @@
       </p:pic>
       <p:pic>
         <p:nvPicPr>
-          <p:cNvPr id="173" name="Imagen 4" descr=""/>
+          <p:cNvPr id="175" name="Imagen 4" descr=""/>
           <p:cNvPicPr/>
           <p:nvPr/>
         </p:nvPicPr>
@@ -9560,7 +9513,7 @@
         <p:spPr>
           <a:xfrm>
             <a:off x="10177920" y="6323040"/>
-            <a:ext cx="1618200" cy="372600"/>
+            <a:ext cx="1617840" cy="372240"/>
           </a:xfrm>
           <a:prstGeom prst="rect">
             <a:avLst/>
@@ -9572,7 +9525,7 @@
       </p:pic>
       <p:pic>
         <p:nvPicPr>
-          <p:cNvPr id="174" name="Imagen 5" descr=""/>
+          <p:cNvPr id="176" name="Imagen 5" descr=""/>
           <p:cNvPicPr/>
           <p:nvPr/>
         </p:nvPicPr>
@@ -9583,7 +9536,7 @@
         <p:spPr>
           <a:xfrm>
             <a:off x="502560" y="6323400"/>
-            <a:ext cx="1904040" cy="440640"/>
+            <a:ext cx="1903680" cy="440280"/>
           </a:xfrm>
           <a:prstGeom prst="rect">
             <a:avLst/>
@@ -9595,7 +9548,7 @@
       </p:pic>
       <p:sp>
         <p:nvSpPr>
-          <p:cNvPr id="175" name="Line 1"/>
+          <p:cNvPr id="177" name="Line 1"/>
           <p:cNvSpPr/>
           <p:nvPr/>
         </p:nvSpPr>
@@ -9629,7 +9582,7 @@
       </p:sp>
       <p:sp>
         <p:nvSpPr>
-          <p:cNvPr id="176" name="PlaceHolder 1"/>
+          <p:cNvPr id="178" name="PlaceHolder 1"/>
           <p:cNvSpPr>
             <a:spLocks noGrp="1"/>
           </p:cNvSpPr>
@@ -9672,7 +9625,7 @@
       </p:sp>
       <p:sp>
         <p:nvSpPr>
-          <p:cNvPr id="177" name="PlaceHolder 2"/>
+          <p:cNvPr id="179" name="PlaceHolder 2"/>
           <p:cNvSpPr>
             <a:spLocks noGrp="1"/>
           </p:cNvSpPr>
@@ -9892,14 +9845,14 @@
       </p:grpSpPr>
       <p:sp>
         <p:nvSpPr>
-          <p:cNvPr id="214" name="TextShape 1"/>
+          <p:cNvPr id="216" name="TextShape 1"/>
           <p:cNvSpPr/>
           <p:nvPr/>
         </p:nvSpPr>
         <p:spPr>
           <a:xfrm>
             <a:off x="2016000" y="144000"/>
-            <a:ext cx="9287280" cy="1439280"/>
+            <a:ext cx="9286920" cy="1438920"/>
           </a:xfrm>
           <a:prstGeom prst="rect">
             <a:avLst/>
@@ -9918,14 +9871,14 @@
       </p:sp>
       <p:sp>
         <p:nvSpPr>
-          <p:cNvPr id="215" name="TextShape 2"/>
+          <p:cNvPr id="217" name="TextShape 2"/>
           <p:cNvSpPr/>
           <p:nvPr/>
         </p:nvSpPr>
         <p:spPr>
           <a:xfrm>
             <a:off x="648000" y="1584000"/>
-            <a:ext cx="10933200" cy="4679280"/>
+            <a:ext cx="10932840" cy="4678920"/>
           </a:xfrm>
           <a:prstGeom prst="rect">
             <a:avLst/>
@@ -9944,7 +9897,7 @@
       </p:sp>
       <p:sp>
         <p:nvSpPr>
-          <p:cNvPr id="216" name="PlaceHolder 1"/>
+          <p:cNvPr id="218" name="PlaceHolder 1"/>
           <p:cNvSpPr>
             <a:spLocks noGrp="1"/>
           </p:cNvSpPr>
@@ -9955,7 +9908,7 @@
         <p:spPr>
           <a:xfrm>
             <a:off x="2762280" y="273600"/>
-            <a:ext cx="8397000" cy="1144080"/>
+            <a:ext cx="8396640" cy="1143720"/>
           </a:xfrm>
           <a:prstGeom prst="rect">
             <a:avLst/>
@@ -9981,7 +9934,7 @@
       </p:sp>
       <p:sp>
         <p:nvSpPr>
-          <p:cNvPr id="217" name="PlaceHolder 2"/>
+          <p:cNvPr id="219" name="PlaceHolder 2"/>
           <p:cNvSpPr>
             <a:spLocks noGrp="1"/>
           </p:cNvSpPr>
@@ -9992,7 +9945,7 @@
         <p:spPr>
           <a:xfrm>
             <a:off x="609480" y="1604520"/>
-            <a:ext cx="10972080" cy="3976920"/>
+            <a:ext cx="10971720" cy="3976560"/>
           </a:xfrm>
           <a:prstGeom prst="rect">
             <a:avLst/>
@@ -10048,14 +10001,14 @@
       </p:grpSpPr>
       <p:sp>
         <p:nvSpPr>
-          <p:cNvPr id="218" name="CustomShape 1"/>
+          <p:cNvPr id="220" name="CustomShape 1"/>
           <p:cNvSpPr/>
           <p:nvPr/>
         </p:nvSpPr>
         <p:spPr>
           <a:xfrm>
             <a:off x="3264480" y="1871640"/>
-            <a:ext cx="7945920" cy="1722240"/>
+            <a:ext cx="7945560" cy="1721880"/>
           </a:xfrm>
           <a:prstGeom prst="rect">
             <a:avLst/>
@@ -10100,14 +10053,14 @@
       </p:sp>
       <p:sp>
         <p:nvSpPr>
-          <p:cNvPr id="219" name="CustomShape 2"/>
+          <p:cNvPr id="221" name="CustomShape 2"/>
           <p:cNvSpPr/>
           <p:nvPr/>
         </p:nvSpPr>
         <p:spPr>
           <a:xfrm>
             <a:off x="3264480" y="3687480"/>
-            <a:ext cx="7945920" cy="1284480"/>
+            <a:ext cx="7945560" cy="1284120"/>
           </a:xfrm>
           <a:prstGeom prst="rect">
             <a:avLst/>
@@ -10155,14 +10108,14 @@
       </p:sp>
       <p:sp>
         <p:nvSpPr>
-          <p:cNvPr id="220" name="CustomShape 3"/>
+          <p:cNvPr id="222" name="CustomShape 3"/>
           <p:cNvSpPr/>
           <p:nvPr/>
         </p:nvSpPr>
         <p:spPr>
           <a:xfrm>
             <a:off x="2863800" y="144000"/>
-            <a:ext cx="7359120" cy="1726560"/>
+            <a:ext cx="7358760" cy="1726200"/>
           </a:xfrm>
           <a:prstGeom prst="rect">
             <a:avLst/>
@@ -10181,14 +10134,14 @@
       </p:sp>
       <p:sp>
         <p:nvSpPr>
-          <p:cNvPr id="221" name="CustomShape 4"/>
+          <p:cNvPr id="223" name="CustomShape 4"/>
           <p:cNvSpPr/>
           <p:nvPr/>
         </p:nvSpPr>
         <p:spPr>
           <a:xfrm>
             <a:off x="2232000" y="1872000"/>
-            <a:ext cx="9780840" cy="3564720"/>
+            <a:ext cx="9780480" cy="3564360"/>
           </a:xfrm>
           <a:prstGeom prst="rect">
             <a:avLst/>
@@ -10237,14 +10190,14 @@
       </p:grpSpPr>
       <p:sp>
         <p:nvSpPr>
-          <p:cNvPr id="222" name="CustomShape 1"/>
+          <p:cNvPr id="224" name="CustomShape 1"/>
           <p:cNvSpPr/>
           <p:nvPr/>
         </p:nvSpPr>
         <p:spPr>
           <a:xfrm>
-            <a:off x="3240000" y="144000"/>
-            <a:ext cx="8111880" cy="1544760"/>
+            <a:off x="3240000" y="1260000"/>
+            <a:ext cx="8111520" cy="428400"/>
           </a:xfrm>
           <a:prstGeom prst="rect">
             <a:avLst/>
@@ -10289,14 +10242,14 @@
       </p:sp>
       <p:sp>
         <p:nvSpPr>
-          <p:cNvPr id="223" name="CustomShape 2"/>
+          <p:cNvPr id="225" name="CustomShape 2"/>
           <p:cNvSpPr/>
           <p:nvPr/>
         </p:nvSpPr>
         <p:spPr>
           <a:xfrm>
-            <a:off x="2304000" y="1368000"/>
-            <a:ext cx="9047880" cy="4807080"/>
+            <a:off x="2304000" y="1604520"/>
+            <a:ext cx="9047520" cy="4570200"/>
           </a:xfrm>
           <a:prstGeom prst="rect">
             <a:avLst/>
@@ -10348,7 +10301,7 @@
       </p:sp>
       <p:sp>
         <p:nvSpPr>
-          <p:cNvPr id="224" name="PlaceHolder 1"/>
+          <p:cNvPr id="226" name="PlaceHolder 1"/>
           <p:cNvSpPr>
             <a:spLocks noGrp="1"/>
           </p:cNvSpPr>
@@ -10358,8 +10311,8 @@
         </p:nvSpPr>
         <p:spPr>
           <a:xfrm>
-            <a:off x="609480" y="273600"/>
-            <a:ext cx="10972440" cy="1144800"/>
+            <a:off x="2700000" y="115560"/>
+            <a:ext cx="8701560" cy="1144440"/>
           </a:xfrm>
           <a:prstGeom prst="rect">
             <a:avLst/>
@@ -10385,7 +10338,7 @@
       </p:sp>
       <p:sp>
         <p:nvSpPr>
-          <p:cNvPr id="225" name="PlaceHolder 2"/>
+          <p:cNvPr id="227" name="PlaceHolder 2"/>
           <p:cNvSpPr>
             <a:spLocks noGrp="1"/>
           </p:cNvSpPr>
@@ -10396,30 +10349,30 @@
         <p:spPr>
           <a:xfrm>
             <a:off x="609480" y="1604520"/>
-            <a:ext cx="5354280" cy="3977280"/>
-          </a:xfrm>
-          <a:prstGeom prst="rect">
-            <a:avLst/>
-          </a:prstGeom>
-          <a:noFill/>
-          <a:ln w="0">
-            <a:noFill/>
-          </a:ln>
-        </p:spPr>
-        <p:txBody>
-          <a:bodyPr lIns="0" rIns="0" tIns="0" bIns="0" anchor="t">
-            <a:normAutofit/>
-          </a:bodyPr>
-          <a:p>
-            <a:endParaRPr b="0" lang="es-AR" sz="3200" spc="-1" strike="noStrike">
-              <a:latin typeface="Arial"/>
-            </a:endParaRPr>
-          </a:p>
-        </p:txBody>
-      </p:sp>
-      <p:sp>
-        <p:nvSpPr>
-          <p:cNvPr id="226" name="PlaceHolder 3"/>
+            <a:ext cx="5353920" cy="3976920"/>
+          </a:xfrm>
+          <a:prstGeom prst="rect">
+            <a:avLst/>
+          </a:prstGeom>
+          <a:noFill/>
+          <a:ln w="0">
+            <a:noFill/>
+          </a:ln>
+        </p:spPr>
+        <p:txBody>
+          <a:bodyPr lIns="0" rIns="0" tIns="0" bIns="0" anchor="t">
+            <a:normAutofit/>
+          </a:bodyPr>
+          <a:p>
+            <a:endParaRPr b="0" lang="es-AR" sz="3200" spc="-1" strike="noStrike">
+              <a:latin typeface="Arial"/>
+            </a:endParaRPr>
+          </a:p>
+        </p:txBody>
+      </p:sp>
+      <p:sp>
+        <p:nvSpPr>
+          <p:cNvPr id="228" name="PlaceHolder 3"/>
           <p:cNvSpPr>
             <a:spLocks noGrp="1"/>
           </p:cNvSpPr>
@@ -10430,7 +10383,7 @@
         <p:spPr>
           <a:xfrm>
             <a:off x="6231960" y="1604520"/>
-            <a:ext cx="5354280" cy="3977280"/>
+            <a:ext cx="5353920" cy="3976920"/>
           </a:xfrm>
           <a:prstGeom prst="rect">
             <a:avLst/>
@@ -10483,14 +10436,14 @@
       </p:grpSpPr>
       <p:sp>
         <p:nvSpPr>
-          <p:cNvPr id="227" name="CustomShape 1"/>
+          <p:cNvPr id="229" name="CustomShape 1"/>
           <p:cNvSpPr/>
           <p:nvPr/>
         </p:nvSpPr>
         <p:spPr>
           <a:xfrm>
             <a:off x="839880" y="457200"/>
-            <a:ext cx="3930480" cy="1598400"/>
+            <a:ext cx="3930120" cy="1598040"/>
           </a:xfrm>
           <a:prstGeom prst="rect">
             <a:avLst/>
@@ -10509,7 +10462,7 @@
       </p:sp>
       <p:pic>
         <p:nvPicPr>
-          <p:cNvPr id="228" name="Marcador de posición de imagen 2" descr=""/>
+          <p:cNvPr id="230" name="Marcador de posición de imagen 2" descr=""/>
           <p:cNvPicPr/>
           <p:nvPr/>
         </p:nvPicPr>
@@ -10520,7 +10473,7 @@
         <p:spPr>
           <a:xfrm>
             <a:off x="5183280" y="987480"/>
-            <a:ext cx="6170400" cy="4871880"/>
+            <a:ext cx="6170040" cy="4871520"/>
           </a:xfrm>
           <a:prstGeom prst="rect">
             <a:avLst/>
@@ -10532,14 +10485,14 @@
       </p:pic>
       <p:sp>
         <p:nvSpPr>
-          <p:cNvPr id="229" name="CustomShape 2"/>
+          <p:cNvPr id="231" name="CustomShape 2"/>
           <p:cNvSpPr/>
           <p:nvPr/>
         </p:nvSpPr>
         <p:spPr>
           <a:xfrm>
             <a:off x="839880" y="2057400"/>
-            <a:ext cx="3930480" cy="3809880"/>
+            <a:ext cx="3930120" cy="3809520"/>
           </a:xfrm>
           <a:prstGeom prst="rect">
             <a:avLst/>
@@ -10588,14 +10541,14 @@
       </p:grpSpPr>
       <p:sp>
         <p:nvSpPr>
-          <p:cNvPr id="230" name="TextShape 1"/>
+          <p:cNvPr id="232" name="TextShape 1"/>
           <p:cNvSpPr/>
           <p:nvPr/>
         </p:nvSpPr>
         <p:spPr>
           <a:xfrm>
             <a:off x="609480" y="273600"/>
-            <a:ext cx="10971720" cy="5307120"/>
+            <a:ext cx="10971360" cy="5306760"/>
           </a:xfrm>
           <a:prstGeom prst="rect">
             <a:avLst/>
@@ -10644,14 +10597,14 @@
       </p:grpSpPr>
       <p:sp>
         <p:nvSpPr>
-          <p:cNvPr id="231" name="CustomShape 1"/>
+          <p:cNvPr id="233" name="CustomShape 1"/>
           <p:cNvSpPr/>
           <p:nvPr/>
         </p:nvSpPr>
         <p:spPr>
           <a:xfrm>
             <a:off x="4090320" y="2754360"/>
-            <a:ext cx="3687120" cy="1099800"/>
+            <a:ext cx="3686760" cy="1099440"/>
           </a:xfrm>
           <a:prstGeom prst="rect">
             <a:avLst/>
@@ -10696,14 +10649,14 @@
       </p:sp>
       <p:sp>
         <p:nvSpPr>
-          <p:cNvPr id="232" name="CustomShape 2"/>
+          <p:cNvPr id="234" name="CustomShape 2"/>
           <p:cNvSpPr/>
           <p:nvPr/>
         </p:nvSpPr>
         <p:spPr>
           <a:xfrm>
             <a:off x="4090320" y="4036320"/>
-            <a:ext cx="3687120" cy="1107720"/>
+            <a:ext cx="3686760" cy="1107360"/>
           </a:xfrm>
           <a:prstGeom prst="rect">
             <a:avLst/>

</xml_diff>